<commit_message>
basic front page design
</commit_message>
<xml_diff>
--- a/developers/App_Layout.pptx
+++ b/developers/App_Layout.pptx
@@ -9,6 +9,7 @@
     <p:sldId id="257" r:id="rId3"/>
     <p:sldId id="258" r:id="rId4"/>
     <p:sldId id="259" r:id="rId5"/>
+    <p:sldId id="260" r:id="rId6"/>
   </p:sldIdLst>
   <p:sldSz cx="12192000" cy="6858000"/>
   <p:notesSz cx="6858000" cy="9144000"/>
@@ -107,7 +108,271 @@
       </a:defRPr>
     </a:lvl9pPr>
   </p:defaultTextStyle>
+  <p:extLst>
+    <p:ext uri="{EFAFB233-063F-42B5-8137-9DF3F51BA10A}">
+      <p15:sldGuideLst xmlns:p15="http://schemas.microsoft.com/office/powerpoint/2012/main"/>
+    </p:ext>
+  </p:extLst>
 </p:presentation>
+</file>
+
+<file path=ppt/revisionInfo.xml><?xml version="1.0" encoding="utf-8"?>
+<p1510:revInfo xmlns:a="http://schemas.openxmlformats.org/drawingml/2006/main" xmlns:r="http://schemas.openxmlformats.org/officeDocument/2006/relationships" xmlns:p1510="http://schemas.microsoft.com/office/powerpoint/2015/10/main">
+  <p1510:revLst>
+    <p1510:client id="{94908476-4F76-4955-B75C-9D6AAD0C10BE}" v="28" dt="2023-09-09T15:05:08.131"/>
+  </p1510:revLst>
+</p1510:revInfo>
+</file>
+
+<file path=ppt/changesInfos/changesInfo1.xml><?xml version="1.0" encoding="utf-8"?>
+<pc:chgInfo xmlns:a="http://schemas.openxmlformats.org/drawingml/2006/main" xmlns:r="http://schemas.openxmlformats.org/officeDocument/2006/relationships" xmlns:ac="http://schemas.microsoft.com/office/drawing/2013/main/command" xmlns:pc="http://schemas.microsoft.com/office/powerpoint/2013/main/command">
+  <pc:docChgLst>
+    <pc:chgData name="HASHAK24" userId="adc0dbee-d402-424e-96ab-936e86920f86" providerId="ADAL" clId="{94908476-4F76-4955-B75C-9D6AAD0C10BE}"/>
+    <pc:docChg chg="undo redo custSel addSld delSld modSld">
+      <pc:chgData name="HASHAK24" userId="adc0dbee-d402-424e-96ab-936e86920f86" providerId="ADAL" clId="{94908476-4F76-4955-B75C-9D6AAD0C10BE}" dt="2023-09-09T15:24:30.367" v="59" actId="478"/>
+      <pc:docMkLst>
+        <pc:docMk/>
+      </pc:docMkLst>
+      <pc:sldChg chg="addSp delSp modSp mod">
+        <pc:chgData name="HASHAK24" userId="adc0dbee-d402-424e-96ab-936e86920f86" providerId="ADAL" clId="{94908476-4F76-4955-B75C-9D6AAD0C10BE}" dt="2023-09-09T15:05:08.131" v="43"/>
+        <pc:sldMkLst>
+          <pc:docMk/>
+          <pc:sldMk cId="17669925" sldId="256"/>
+        </pc:sldMkLst>
+        <pc:spChg chg="add mod">
+          <ac:chgData name="HASHAK24" userId="adc0dbee-d402-424e-96ab-936e86920f86" providerId="ADAL" clId="{94908476-4F76-4955-B75C-9D6AAD0C10BE}" dt="2023-09-09T15:03:17.003" v="24" actId="207"/>
+          <ac:spMkLst>
+            <pc:docMk/>
+            <pc:sldMk cId="17669925" sldId="256"/>
+            <ac:spMk id="4" creationId="{AB2E4272-CE08-DA84-26FA-352F3B6533C8}"/>
+          </ac:spMkLst>
+        </pc:spChg>
+        <pc:picChg chg="add del mod">
+          <ac:chgData name="HASHAK24" userId="adc0dbee-d402-424e-96ab-936e86920f86" providerId="ADAL" clId="{94908476-4F76-4955-B75C-9D6AAD0C10BE}" dt="2023-09-09T15:05:08.131" v="43"/>
+          <ac:picMkLst>
+            <pc:docMk/>
+            <pc:sldMk cId="17669925" sldId="256"/>
+            <ac:picMk id="3" creationId="{0E58EB02-6323-CFD1-C324-A22322265972}"/>
+          </ac:picMkLst>
+        </pc:picChg>
+        <pc:picChg chg="add del">
+          <ac:chgData name="HASHAK24" userId="adc0dbee-d402-424e-96ab-936e86920f86" providerId="ADAL" clId="{94908476-4F76-4955-B75C-9D6AAD0C10BE}" dt="2023-09-09T15:03:01.479" v="10" actId="478"/>
+          <ac:picMkLst>
+            <pc:docMk/>
+            <pc:sldMk cId="17669925" sldId="256"/>
+            <ac:picMk id="5" creationId="{25A12393-9C15-996E-2D9C-4B26D7C54625}"/>
+          </ac:picMkLst>
+        </pc:picChg>
+      </pc:sldChg>
+      <pc:sldChg chg="addSp delSp modSp add del mod">
+        <pc:chgData name="HASHAK24" userId="adc0dbee-d402-424e-96ab-936e86920f86" providerId="ADAL" clId="{94908476-4F76-4955-B75C-9D6AAD0C10BE}" dt="2023-09-09T15:20:27.205" v="54" actId="47"/>
+        <pc:sldMkLst>
+          <pc:docMk/>
+          <pc:sldMk cId="1634535299" sldId="260"/>
+        </pc:sldMkLst>
+        <pc:spChg chg="del">
+          <ac:chgData name="HASHAK24" userId="adc0dbee-d402-424e-96ab-936e86920f86" providerId="ADAL" clId="{94908476-4F76-4955-B75C-9D6AAD0C10BE}" dt="2023-09-09T15:19:52.148" v="45" actId="478"/>
+          <ac:spMkLst>
+            <pc:docMk/>
+            <pc:sldMk cId="1634535299" sldId="260"/>
+            <ac:spMk id="3" creationId="{2B2DD87D-C487-1002-8B50-58FBD9A5A212}"/>
+          </ac:spMkLst>
+        </pc:spChg>
+        <pc:spChg chg="del">
+          <ac:chgData name="HASHAK24" userId="adc0dbee-d402-424e-96ab-936e86920f86" providerId="ADAL" clId="{94908476-4F76-4955-B75C-9D6AAD0C10BE}" dt="2023-09-09T15:19:52.148" v="45" actId="478"/>
+          <ac:spMkLst>
+            <pc:docMk/>
+            <pc:sldMk cId="1634535299" sldId="260"/>
+            <ac:spMk id="6" creationId="{AE54FD78-00E9-1873-20B5-E55BD58D0CBB}"/>
+          </ac:spMkLst>
+        </pc:spChg>
+        <pc:spChg chg="del">
+          <ac:chgData name="HASHAK24" userId="adc0dbee-d402-424e-96ab-936e86920f86" providerId="ADAL" clId="{94908476-4F76-4955-B75C-9D6AAD0C10BE}" dt="2023-09-09T15:19:52.148" v="45" actId="478"/>
+          <ac:spMkLst>
+            <pc:docMk/>
+            <pc:sldMk cId="1634535299" sldId="260"/>
+            <ac:spMk id="11" creationId="{4F567C11-A171-0440-00DC-40ECCDEC77C0}"/>
+          </ac:spMkLst>
+        </pc:spChg>
+        <pc:spChg chg="del">
+          <ac:chgData name="HASHAK24" userId="adc0dbee-d402-424e-96ab-936e86920f86" providerId="ADAL" clId="{94908476-4F76-4955-B75C-9D6AAD0C10BE}" dt="2023-09-09T15:19:52.148" v="45" actId="478"/>
+          <ac:spMkLst>
+            <pc:docMk/>
+            <pc:sldMk cId="1634535299" sldId="260"/>
+            <ac:spMk id="13" creationId="{18CA5FB5-8083-B575-ED63-4593A9C00075}"/>
+          </ac:spMkLst>
+        </pc:spChg>
+        <pc:spChg chg="del">
+          <ac:chgData name="HASHAK24" userId="adc0dbee-d402-424e-96ab-936e86920f86" providerId="ADAL" clId="{94908476-4F76-4955-B75C-9D6AAD0C10BE}" dt="2023-09-09T15:19:52.148" v="45" actId="478"/>
+          <ac:spMkLst>
+            <pc:docMk/>
+            <pc:sldMk cId="1634535299" sldId="260"/>
+            <ac:spMk id="14" creationId="{BA412493-0670-1FAD-C045-72C4174368A8}"/>
+          </ac:spMkLst>
+        </pc:spChg>
+        <pc:spChg chg="del">
+          <ac:chgData name="HASHAK24" userId="adc0dbee-d402-424e-96ab-936e86920f86" providerId="ADAL" clId="{94908476-4F76-4955-B75C-9D6AAD0C10BE}" dt="2023-09-09T15:19:52.148" v="45" actId="478"/>
+          <ac:spMkLst>
+            <pc:docMk/>
+            <pc:sldMk cId="1634535299" sldId="260"/>
+            <ac:spMk id="15" creationId="{01D1E2F4-6C8E-118C-DC55-A30737DDD45E}"/>
+          </ac:spMkLst>
+        </pc:spChg>
+        <pc:graphicFrameChg chg="del">
+          <ac:chgData name="HASHAK24" userId="adc0dbee-d402-424e-96ab-936e86920f86" providerId="ADAL" clId="{94908476-4F76-4955-B75C-9D6AAD0C10BE}" dt="2023-09-09T15:19:52.148" v="45" actId="478"/>
+          <ac:graphicFrameMkLst>
+            <pc:docMk/>
+            <pc:sldMk cId="1634535299" sldId="260"/>
+            <ac:graphicFrameMk id="19" creationId="{014D4CDA-43FD-1624-0927-C73B790E3317}"/>
+          </ac:graphicFrameMkLst>
+        </pc:graphicFrameChg>
+        <pc:picChg chg="add del">
+          <ac:chgData name="HASHAK24" userId="adc0dbee-d402-424e-96ab-936e86920f86" providerId="ADAL" clId="{94908476-4F76-4955-B75C-9D6AAD0C10BE}" dt="2023-09-09T15:20:12.215" v="48" actId="478"/>
+          <ac:picMkLst>
+            <pc:docMk/>
+            <pc:sldMk cId="1634535299" sldId="260"/>
+            <ac:picMk id="4" creationId="{5572C34A-22C5-350F-0D55-8678603EB525}"/>
+          </ac:picMkLst>
+        </pc:picChg>
+        <pc:picChg chg="del">
+          <ac:chgData name="HASHAK24" userId="adc0dbee-d402-424e-96ab-936e86920f86" providerId="ADAL" clId="{94908476-4F76-4955-B75C-9D6AAD0C10BE}" dt="2023-09-09T15:19:52.148" v="45" actId="478"/>
+          <ac:picMkLst>
+            <pc:docMk/>
+            <pc:sldMk cId="1634535299" sldId="260"/>
+            <ac:picMk id="5" creationId="{25A12393-9C15-996E-2D9C-4B26D7C54625}"/>
+          </ac:picMkLst>
+        </pc:picChg>
+        <pc:picChg chg="del">
+          <ac:chgData name="HASHAK24" userId="adc0dbee-d402-424e-96ab-936e86920f86" providerId="ADAL" clId="{94908476-4F76-4955-B75C-9D6AAD0C10BE}" dt="2023-09-09T15:19:52.148" v="45" actId="478"/>
+          <ac:picMkLst>
+            <pc:docMk/>
+            <pc:sldMk cId="1634535299" sldId="260"/>
+            <ac:picMk id="10" creationId="{9F98282D-BB2F-201D-D585-882C5F46E565}"/>
+          </ac:picMkLst>
+        </pc:picChg>
+        <pc:picChg chg="add del">
+          <ac:chgData name="HASHAK24" userId="adc0dbee-d402-424e-96ab-936e86920f86" providerId="ADAL" clId="{94908476-4F76-4955-B75C-9D6AAD0C10BE}" dt="2023-09-09T15:20:26.522" v="53" actId="478"/>
+          <ac:picMkLst>
+            <pc:docMk/>
+            <pc:sldMk cId="1634535299" sldId="260"/>
+            <ac:picMk id="12" creationId="{1632CB1F-D12E-BD14-9973-181B346E2871}"/>
+          </ac:picMkLst>
+        </pc:picChg>
+        <pc:cxnChg chg="add del mod">
+          <ac:chgData name="HASHAK24" userId="adc0dbee-d402-424e-96ab-936e86920f86" providerId="ADAL" clId="{94908476-4F76-4955-B75C-9D6AAD0C10BE}" dt="2023-09-09T15:20:14.269" v="49" actId="478"/>
+          <ac:cxnSpMkLst>
+            <pc:docMk/>
+            <pc:sldMk cId="1634535299" sldId="260"/>
+            <ac:cxnSpMk id="8" creationId="{1F22CA9F-8D1B-8A0E-F334-E1C48F25CF9C}"/>
+          </ac:cxnSpMkLst>
+        </pc:cxnChg>
+        <pc:cxnChg chg="add del mod">
+          <ac:chgData name="HASHAK24" userId="adc0dbee-d402-424e-96ab-936e86920f86" providerId="ADAL" clId="{94908476-4F76-4955-B75C-9D6AAD0C10BE}" dt="2023-09-09T15:20:25.389" v="52" actId="478"/>
+          <ac:cxnSpMkLst>
+            <pc:docMk/>
+            <pc:sldMk cId="1634535299" sldId="260"/>
+            <ac:cxnSpMk id="17" creationId="{AF5DA54D-07D4-EB27-710C-BC71D0538A8F}"/>
+          </ac:cxnSpMkLst>
+        </pc:cxnChg>
+      </pc:sldChg>
+      <pc:sldChg chg="addSp delSp modSp add mod">
+        <pc:chgData name="HASHAK24" userId="adc0dbee-d402-424e-96ab-936e86920f86" providerId="ADAL" clId="{94908476-4F76-4955-B75C-9D6AAD0C10BE}" dt="2023-09-09T15:24:30.367" v="59" actId="478"/>
+        <pc:sldMkLst>
+          <pc:docMk/>
+          <pc:sldMk cId="3993883768" sldId="260"/>
+        </pc:sldMkLst>
+        <pc:spChg chg="del">
+          <ac:chgData name="HASHAK24" userId="adc0dbee-d402-424e-96ab-936e86920f86" providerId="ADAL" clId="{94908476-4F76-4955-B75C-9D6AAD0C10BE}" dt="2023-09-09T15:24:13.270" v="56" actId="478"/>
+          <ac:spMkLst>
+            <pc:docMk/>
+            <pc:sldMk cId="3993883768" sldId="260"/>
+            <ac:spMk id="3" creationId="{2B2DD87D-C487-1002-8B50-58FBD9A5A212}"/>
+          </ac:spMkLst>
+        </pc:spChg>
+        <pc:spChg chg="del">
+          <ac:chgData name="HASHAK24" userId="adc0dbee-d402-424e-96ab-936e86920f86" providerId="ADAL" clId="{94908476-4F76-4955-B75C-9D6AAD0C10BE}" dt="2023-09-09T15:24:13.270" v="56" actId="478"/>
+          <ac:spMkLst>
+            <pc:docMk/>
+            <pc:sldMk cId="3993883768" sldId="260"/>
+            <ac:spMk id="6" creationId="{AE54FD78-00E9-1873-20B5-E55BD58D0CBB}"/>
+          </ac:spMkLst>
+        </pc:spChg>
+        <pc:spChg chg="del">
+          <ac:chgData name="HASHAK24" userId="adc0dbee-d402-424e-96ab-936e86920f86" providerId="ADAL" clId="{94908476-4F76-4955-B75C-9D6AAD0C10BE}" dt="2023-09-09T15:24:13.270" v="56" actId="478"/>
+          <ac:spMkLst>
+            <pc:docMk/>
+            <pc:sldMk cId="3993883768" sldId="260"/>
+            <ac:spMk id="11" creationId="{4F567C11-A171-0440-00DC-40ECCDEC77C0}"/>
+          </ac:spMkLst>
+        </pc:spChg>
+        <pc:spChg chg="del">
+          <ac:chgData name="HASHAK24" userId="adc0dbee-d402-424e-96ab-936e86920f86" providerId="ADAL" clId="{94908476-4F76-4955-B75C-9D6AAD0C10BE}" dt="2023-09-09T15:24:13.270" v="56" actId="478"/>
+          <ac:spMkLst>
+            <pc:docMk/>
+            <pc:sldMk cId="3993883768" sldId="260"/>
+            <ac:spMk id="13" creationId="{18CA5FB5-8083-B575-ED63-4593A9C00075}"/>
+          </ac:spMkLst>
+        </pc:spChg>
+        <pc:spChg chg="del">
+          <ac:chgData name="HASHAK24" userId="adc0dbee-d402-424e-96ab-936e86920f86" providerId="ADAL" clId="{94908476-4F76-4955-B75C-9D6AAD0C10BE}" dt="2023-09-09T15:24:13.270" v="56" actId="478"/>
+          <ac:spMkLst>
+            <pc:docMk/>
+            <pc:sldMk cId="3993883768" sldId="260"/>
+            <ac:spMk id="14" creationId="{BA412493-0670-1FAD-C045-72C4174368A8}"/>
+          </ac:spMkLst>
+        </pc:spChg>
+        <pc:spChg chg="del">
+          <ac:chgData name="HASHAK24" userId="adc0dbee-d402-424e-96ab-936e86920f86" providerId="ADAL" clId="{94908476-4F76-4955-B75C-9D6AAD0C10BE}" dt="2023-09-09T15:24:13.270" v="56" actId="478"/>
+          <ac:spMkLst>
+            <pc:docMk/>
+            <pc:sldMk cId="3993883768" sldId="260"/>
+            <ac:spMk id="15" creationId="{01D1E2F4-6C8E-118C-DC55-A30737DDD45E}"/>
+          </ac:spMkLst>
+        </pc:spChg>
+        <pc:graphicFrameChg chg="del">
+          <ac:chgData name="HASHAK24" userId="adc0dbee-d402-424e-96ab-936e86920f86" providerId="ADAL" clId="{94908476-4F76-4955-B75C-9D6AAD0C10BE}" dt="2023-09-09T15:24:13.270" v="56" actId="478"/>
+          <ac:graphicFrameMkLst>
+            <pc:docMk/>
+            <pc:sldMk cId="3993883768" sldId="260"/>
+            <ac:graphicFrameMk id="19" creationId="{014D4CDA-43FD-1624-0927-C73B790E3317}"/>
+          </ac:graphicFrameMkLst>
+        </pc:graphicFrameChg>
+        <pc:picChg chg="add">
+          <ac:chgData name="HASHAK24" userId="adc0dbee-d402-424e-96ab-936e86920f86" providerId="ADAL" clId="{94908476-4F76-4955-B75C-9D6AAD0C10BE}" dt="2023-09-09T15:24:13.803" v="57" actId="22"/>
+          <ac:picMkLst>
+            <pc:docMk/>
+            <pc:sldMk cId="3993883768" sldId="260"/>
+            <ac:picMk id="4" creationId="{B7A6C20F-F64B-48CE-7EAC-E58D9D5FF646}"/>
+          </ac:picMkLst>
+        </pc:picChg>
+        <pc:picChg chg="del">
+          <ac:chgData name="HASHAK24" userId="adc0dbee-d402-424e-96ab-936e86920f86" providerId="ADAL" clId="{94908476-4F76-4955-B75C-9D6AAD0C10BE}" dt="2023-09-09T15:24:13.270" v="56" actId="478"/>
+          <ac:picMkLst>
+            <pc:docMk/>
+            <pc:sldMk cId="3993883768" sldId="260"/>
+            <ac:picMk id="5" creationId="{25A12393-9C15-996E-2D9C-4B26D7C54625}"/>
+          </ac:picMkLst>
+        </pc:picChg>
+        <pc:picChg chg="del">
+          <ac:chgData name="HASHAK24" userId="adc0dbee-d402-424e-96ab-936e86920f86" providerId="ADAL" clId="{94908476-4F76-4955-B75C-9D6AAD0C10BE}" dt="2023-09-09T15:24:13.270" v="56" actId="478"/>
+          <ac:picMkLst>
+            <pc:docMk/>
+            <pc:sldMk cId="3993883768" sldId="260"/>
+            <ac:picMk id="10" creationId="{9F98282D-BB2F-201D-D585-882C5F46E565}"/>
+          </ac:picMkLst>
+        </pc:picChg>
+        <pc:cxnChg chg="add del mod">
+          <ac:chgData name="HASHAK24" userId="adc0dbee-d402-424e-96ab-936e86920f86" providerId="ADAL" clId="{94908476-4F76-4955-B75C-9D6AAD0C10BE}" dt="2023-09-09T15:24:30.367" v="59" actId="478"/>
+          <ac:cxnSpMkLst>
+            <pc:docMk/>
+            <pc:sldMk cId="3993883768" sldId="260"/>
+            <ac:cxnSpMk id="8" creationId="{49D4FC0E-4F55-0466-5927-1BD5C4C03AC5}"/>
+          </ac:cxnSpMkLst>
+        </pc:cxnChg>
+      </pc:sldChg>
+    </pc:docChg>
+  </pc:docChgLst>
+</pc:chgInfo>
 </file>
 
 <file path=ppt/charts/chart1.xml><?xml version="1.0" encoding="utf-8"?>
@@ -157,6 +422,11 @@
               </a:ln>
               <a:effectLst/>
             </c:spPr>
+            <c:extLst>
+              <c:ext xmlns:c16="http://schemas.microsoft.com/office/drawing/2014/chart" uri="{C3380CC4-5D6E-409C-BE32-E72D297353CC}">
+                <c16:uniqueId val="{00000001-D62C-410C-B074-ECA1C37120D7}"/>
+              </c:ext>
+            </c:extLst>
           </c:dPt>
           <c:dPt>
             <c:idx val="1"/>
@@ -172,6 +442,11 @@
               </a:ln>
               <a:effectLst/>
             </c:spPr>
+            <c:extLst>
+              <c:ext xmlns:c16="http://schemas.microsoft.com/office/drawing/2014/chart" uri="{C3380CC4-5D6E-409C-BE32-E72D297353CC}">
+                <c16:uniqueId val="{00000003-D62C-410C-B074-ECA1C37120D7}"/>
+              </c:ext>
+            </c:extLst>
           </c:dPt>
           <c:dPt>
             <c:idx val="2"/>
@@ -187,6 +462,11 @@
               </a:ln>
               <a:effectLst/>
             </c:spPr>
+            <c:extLst>
+              <c:ext xmlns:c16="http://schemas.microsoft.com/office/drawing/2014/chart" uri="{C3380CC4-5D6E-409C-BE32-E72D297353CC}">
+                <c16:uniqueId val="{00000005-D62C-410C-B074-ECA1C37120D7}"/>
+              </c:ext>
+            </c:extLst>
           </c:dPt>
           <c:dPt>
             <c:idx val="3"/>
@@ -202,6 +482,11 @@
               </a:ln>
               <a:effectLst/>
             </c:spPr>
+            <c:extLst>
+              <c:ext xmlns:c16="http://schemas.microsoft.com/office/drawing/2014/chart" uri="{C3380CC4-5D6E-409C-BE32-E72D297353CC}">
+                <c16:uniqueId val="{00000007-D62C-410C-B074-ECA1C37120D7}"/>
+              </c:ext>
+            </c:extLst>
           </c:dPt>
           <c:cat>
             <c:strRef>
@@ -4097,36 +4382,6 @@
           <a:chExt cx="0" cy="0"/>
         </a:xfrm>
       </p:grpSpPr>
-      <p:pic>
-        <p:nvPicPr>
-          <p:cNvPr id="5" name="Picture 4">
-            <a:extLst>
-              <a:ext uri="{FF2B5EF4-FFF2-40B4-BE49-F238E27FC236}">
-                <a16:creationId xmlns:a16="http://schemas.microsoft.com/office/drawing/2014/main" id="{25A12393-9C15-996E-2D9C-4B26D7C54625}"/>
-              </a:ext>
-            </a:extLst>
-          </p:cNvPr>
-          <p:cNvPicPr>
-            <a:picLocks noChangeAspect="1"/>
-          </p:cNvPicPr>
-          <p:nvPr/>
-        </p:nvPicPr>
-        <p:blipFill>
-          <a:blip r:embed="rId2"/>
-          <a:stretch>
-            <a:fillRect/>
-          </a:stretch>
-        </p:blipFill>
-        <p:spPr>
-          <a:xfrm>
-            <a:off x="3222690" y="689136"/>
-            <a:ext cx="5746620" cy="1304909"/>
-          </a:xfrm>
-          <a:prstGeom prst="rect">
-            <a:avLst/>
-          </a:prstGeom>
-        </p:spPr>
-      </p:pic>
       <p:sp>
         <p:nvSpPr>
           <p:cNvPr id="6" name="TextBox 5">
@@ -4258,6 +4513,86 @@
               <a:t>Blah blah</a:t>
             </a:r>
             <a:endParaRPr lang="LID4096" dirty="0"/>
+          </a:p>
+        </p:txBody>
+      </p:sp>
+      <p:pic>
+        <p:nvPicPr>
+          <p:cNvPr id="3" name="Picture 2" descr="A black silhouette of a bear&#10;&#10;Description automatically generated">
+            <a:extLst>
+              <a:ext uri="{FF2B5EF4-FFF2-40B4-BE49-F238E27FC236}">
+                <a16:creationId xmlns:a16="http://schemas.microsoft.com/office/drawing/2014/main" id="{0E58EB02-6323-CFD1-C324-A22322265972}"/>
+              </a:ext>
+            </a:extLst>
+          </p:cNvPr>
+          <p:cNvPicPr>
+            <a:picLocks noChangeAspect="1"/>
+          </p:cNvPicPr>
+          <p:nvPr/>
+        </p:nvPicPr>
+        <p:blipFill>
+          <a:blip r:embed="rId2">
+            <a:extLst>
+              <a:ext uri="{28A0092B-C50C-407E-A947-70E740481C1C}">
+                <a14:useLocalDpi xmlns:a14="http://schemas.microsoft.com/office/drawing/2010/main" val="0"/>
+              </a:ext>
+            </a:extLst>
+          </a:blip>
+          <a:stretch>
+            <a:fillRect/>
+          </a:stretch>
+        </p:blipFill>
+        <p:spPr>
+          <a:xfrm>
+            <a:off x="2224086" y="360456"/>
+            <a:ext cx="7743826" cy="1793839"/>
+          </a:xfrm>
+          <a:prstGeom prst="rect">
+            <a:avLst/>
+          </a:prstGeom>
+        </p:spPr>
+      </p:pic>
+      <p:sp>
+        <p:nvSpPr>
+          <p:cNvPr id="4" name="TextBox 3">
+            <a:extLst>
+              <a:ext uri="{FF2B5EF4-FFF2-40B4-BE49-F238E27FC236}">
+                <a16:creationId xmlns:a16="http://schemas.microsoft.com/office/drawing/2014/main" id="{AB2E4272-CE08-DA84-26FA-352F3B6533C8}"/>
+              </a:ext>
+            </a:extLst>
+          </p:cNvPr>
+          <p:cNvSpPr txBox="1"/>
+          <p:nvPr/>
+        </p:nvSpPr>
+        <p:spPr>
+          <a:xfrm>
+            <a:off x="1494064" y="3244227"/>
+            <a:ext cx="1047082" cy="369332"/>
+          </a:xfrm>
+          <a:prstGeom prst="rect">
+            <a:avLst/>
+          </a:prstGeom>
+          <a:noFill/>
+        </p:spPr>
+        <p:txBody>
+          <a:bodyPr wrap="none" rtlCol="0">
+            <a:spAutoFit/>
+          </a:bodyPr>
+          <a:lstStyle/>
+          <a:p>
+            <a:r>
+              <a:rPr lang="en-US" dirty="0" err="1">
+                <a:solidFill>
+                  <a:srgbClr val="EEEEEE"/>
+                </a:solidFill>
+              </a:rPr>
+              <a:t>asdgsdag</a:t>
+            </a:r>
+            <a:endParaRPr lang="LID4096" dirty="0">
+              <a:solidFill>
+                <a:srgbClr val="EEEEEE"/>
+              </a:solidFill>
+            </a:endParaRPr>
           </a:p>
         </p:txBody>
       </p:sp>
@@ -4953,6 +5288,66 @@
     <p:extLst>
       <p:ext uri="{BB962C8B-B14F-4D97-AF65-F5344CB8AC3E}">
         <p14:creationId xmlns:p14="http://schemas.microsoft.com/office/powerpoint/2010/main" val="2915010406"/>
+      </p:ext>
+    </p:extLst>
+  </p:cSld>
+  <p:clrMapOvr>
+    <a:masterClrMapping/>
+  </p:clrMapOvr>
+</p:sld>
+</file>
+
+<file path=ppt/slides/slide5.xml><?xml version="1.0" encoding="utf-8"?>
+<p:sld xmlns:a="http://schemas.openxmlformats.org/drawingml/2006/main" xmlns:r="http://schemas.openxmlformats.org/officeDocument/2006/relationships" xmlns:p="http://schemas.openxmlformats.org/presentationml/2006/main">
+  <p:cSld>
+    <p:spTree>
+      <p:nvGrpSpPr>
+        <p:cNvPr id="1" name=""/>
+        <p:cNvGrpSpPr/>
+        <p:nvPr/>
+      </p:nvGrpSpPr>
+      <p:grpSpPr>
+        <a:xfrm>
+          <a:off x="0" y="0"/>
+          <a:ext cx="0" cy="0"/>
+          <a:chOff x="0" y="0"/>
+          <a:chExt cx="0" cy="0"/>
+        </a:xfrm>
+      </p:grpSpPr>
+      <p:pic>
+        <p:nvPicPr>
+          <p:cNvPr id="4" name="Picture 3">
+            <a:extLst>
+              <a:ext uri="{FF2B5EF4-FFF2-40B4-BE49-F238E27FC236}">
+                <a16:creationId xmlns:a16="http://schemas.microsoft.com/office/drawing/2014/main" id="{B7A6C20F-F64B-48CE-7EAC-E58D9D5FF646}"/>
+              </a:ext>
+            </a:extLst>
+          </p:cNvPr>
+          <p:cNvPicPr>
+            <a:picLocks noChangeAspect="1"/>
+          </p:cNvPicPr>
+          <p:nvPr/>
+        </p:nvPicPr>
+        <p:blipFill>
+          <a:blip r:embed="rId2"/>
+          <a:stretch>
+            <a:fillRect/>
+          </a:stretch>
+        </p:blipFill>
+        <p:spPr>
+          <a:xfrm>
+            <a:off x="0" y="1309762"/>
+            <a:ext cx="12192000" cy="4238476"/>
+          </a:xfrm>
+          <a:prstGeom prst="rect">
+            <a:avLst/>
+          </a:prstGeom>
+        </p:spPr>
+      </p:pic>
+    </p:spTree>
+    <p:extLst>
+      <p:ext uri="{BB962C8B-B14F-4D97-AF65-F5344CB8AC3E}">
+        <p14:creationId xmlns:p14="http://schemas.microsoft.com/office/powerpoint/2010/main" val="3993883768"/>
       </p:ext>
     </p:extLst>
   </p:cSld>

</xml_diff>

<commit_message>
finally centered my div
</commit_message>
<xml_diff>
--- a/developers/App_Layout.pptx
+++ b/developers/App_Layout.pptx
@@ -119,7 +119,7 @@
 <file path=ppt/revisionInfo.xml><?xml version="1.0" encoding="utf-8"?>
 <p1510:revInfo xmlns:a="http://schemas.openxmlformats.org/drawingml/2006/main" xmlns:r="http://schemas.openxmlformats.org/officeDocument/2006/relationships" xmlns:p1510="http://schemas.microsoft.com/office/powerpoint/2015/10/main">
   <p1510:revLst>
-    <p1510:client id="{94908476-4F76-4955-B75C-9D6AAD0C10BE}" v="28" dt="2023-09-09T15:05:08.131"/>
+    <p1510:client id="{94908476-4F76-4955-B75C-9D6AAD0C10BE}" v="29" dt="2023-09-10T12:30:47.445"/>
   </p1510:revLst>
 </p1510:revInfo>
 </file>
@@ -129,7 +129,7 @@
   <pc:docChgLst>
     <pc:chgData name="HASHAK24" userId="adc0dbee-d402-424e-96ab-936e86920f86" providerId="ADAL" clId="{94908476-4F76-4955-B75C-9D6AAD0C10BE}"/>
     <pc:docChg chg="undo redo custSel addSld delSld modSld">
-      <pc:chgData name="HASHAK24" userId="adc0dbee-d402-424e-96ab-936e86920f86" providerId="ADAL" clId="{94908476-4F76-4955-B75C-9D6AAD0C10BE}" dt="2023-09-09T15:24:30.367" v="59" actId="478"/>
+      <pc:chgData name="HASHAK24" userId="adc0dbee-d402-424e-96ab-936e86920f86" providerId="ADAL" clId="{94908476-4F76-4955-B75C-9D6AAD0C10BE}" dt="2023-09-10T12:30:49.624" v="69" actId="20577"/>
       <pc:docMkLst>
         <pc:docMk/>
       </pc:docMkLst>
@@ -163,6 +163,29 @@
             <ac:picMk id="5" creationId="{25A12393-9C15-996E-2D9C-4B26D7C54625}"/>
           </ac:picMkLst>
         </pc:picChg>
+      </pc:sldChg>
+      <pc:sldChg chg="addSp modSp mod">
+        <pc:chgData name="HASHAK24" userId="adc0dbee-d402-424e-96ab-936e86920f86" providerId="ADAL" clId="{94908476-4F76-4955-B75C-9D6AAD0C10BE}" dt="2023-09-10T12:30:49.624" v="69" actId="20577"/>
+        <pc:sldMkLst>
+          <pc:docMk/>
+          <pc:sldMk cId="1174655981" sldId="258"/>
+        </pc:sldMkLst>
+        <pc:spChg chg="mod">
+          <ac:chgData name="HASHAK24" userId="adc0dbee-d402-424e-96ab-936e86920f86" providerId="ADAL" clId="{94908476-4F76-4955-B75C-9D6AAD0C10BE}" dt="2023-09-10T12:30:45.727" v="60" actId="1076"/>
+          <ac:spMkLst>
+            <pc:docMk/>
+            <pc:sldMk cId="1174655981" sldId="258"/>
+            <ac:spMk id="2" creationId="{842BD4DC-D9FC-8122-2BBD-C1881A701693}"/>
+          </ac:spMkLst>
+        </pc:spChg>
+        <pc:spChg chg="add mod">
+          <ac:chgData name="HASHAK24" userId="adc0dbee-d402-424e-96ab-936e86920f86" providerId="ADAL" clId="{94908476-4F76-4955-B75C-9D6AAD0C10BE}" dt="2023-09-10T12:30:49.624" v="69" actId="20577"/>
+          <ac:spMkLst>
+            <pc:docMk/>
+            <pc:sldMk cId="1174655981" sldId="258"/>
+            <ac:spMk id="3" creationId="{BF61434D-6336-DC9F-FAEA-BD6CC3B53D15}"/>
+          </ac:spMkLst>
+        </pc:spChg>
       </pc:sldChg>
       <pc:sldChg chg="addSp delSp modSp add del mod">
         <pc:chgData name="HASHAK24" userId="adc0dbee-d402-424e-96ab-936e86920f86" providerId="ADAL" clId="{94908476-4F76-4955-B75C-9D6AAD0C10BE}" dt="2023-09-09T15:20:27.205" v="54" actId="47"/>
@@ -1296,7 +1319,7 @@
           <a:p>
             <a:fld id="{0E9C1207-8C0F-4467-9EE0-B66820579898}" type="datetimeFigureOut">
               <a:rPr lang="LID4096" smtClean="0"/>
-              <a:t>09/09/2023</a:t>
+              <a:t>09/10/2023</a:t>
             </a:fld>
             <a:endParaRPr lang="LID4096"/>
           </a:p>
@@ -1496,7 +1519,7 @@
           <a:p>
             <a:fld id="{0E9C1207-8C0F-4467-9EE0-B66820579898}" type="datetimeFigureOut">
               <a:rPr lang="LID4096" smtClean="0"/>
-              <a:t>09/09/2023</a:t>
+              <a:t>09/10/2023</a:t>
             </a:fld>
             <a:endParaRPr lang="LID4096"/>
           </a:p>
@@ -1706,7 +1729,7 @@
           <a:p>
             <a:fld id="{0E9C1207-8C0F-4467-9EE0-B66820579898}" type="datetimeFigureOut">
               <a:rPr lang="LID4096" smtClean="0"/>
-              <a:t>09/09/2023</a:t>
+              <a:t>09/10/2023</a:t>
             </a:fld>
             <a:endParaRPr lang="LID4096"/>
           </a:p>
@@ -1906,7 +1929,7 @@
           <a:p>
             <a:fld id="{0E9C1207-8C0F-4467-9EE0-B66820579898}" type="datetimeFigureOut">
               <a:rPr lang="LID4096" smtClean="0"/>
-              <a:t>09/09/2023</a:t>
+              <a:t>09/10/2023</a:t>
             </a:fld>
             <a:endParaRPr lang="LID4096"/>
           </a:p>
@@ -2182,7 +2205,7 @@
           <a:p>
             <a:fld id="{0E9C1207-8C0F-4467-9EE0-B66820579898}" type="datetimeFigureOut">
               <a:rPr lang="LID4096" smtClean="0"/>
-              <a:t>09/09/2023</a:t>
+              <a:t>09/10/2023</a:t>
             </a:fld>
             <a:endParaRPr lang="LID4096"/>
           </a:p>
@@ -2450,7 +2473,7 @@
           <a:p>
             <a:fld id="{0E9C1207-8C0F-4467-9EE0-B66820579898}" type="datetimeFigureOut">
               <a:rPr lang="LID4096" smtClean="0"/>
-              <a:t>09/09/2023</a:t>
+              <a:t>09/10/2023</a:t>
             </a:fld>
             <a:endParaRPr lang="LID4096"/>
           </a:p>
@@ -2865,7 +2888,7 @@
           <a:p>
             <a:fld id="{0E9C1207-8C0F-4467-9EE0-B66820579898}" type="datetimeFigureOut">
               <a:rPr lang="LID4096" smtClean="0"/>
-              <a:t>09/09/2023</a:t>
+              <a:t>09/10/2023</a:t>
             </a:fld>
             <a:endParaRPr lang="LID4096"/>
           </a:p>
@@ -3007,7 +3030,7 @@
           <a:p>
             <a:fld id="{0E9C1207-8C0F-4467-9EE0-B66820579898}" type="datetimeFigureOut">
               <a:rPr lang="LID4096" smtClean="0"/>
-              <a:t>09/09/2023</a:t>
+              <a:t>09/10/2023</a:t>
             </a:fld>
             <a:endParaRPr lang="LID4096"/>
           </a:p>
@@ -3120,7 +3143,7 @@
           <a:p>
             <a:fld id="{0E9C1207-8C0F-4467-9EE0-B66820579898}" type="datetimeFigureOut">
               <a:rPr lang="LID4096" smtClean="0"/>
-              <a:t>09/09/2023</a:t>
+              <a:t>09/10/2023</a:t>
             </a:fld>
             <a:endParaRPr lang="LID4096"/>
           </a:p>
@@ -3433,7 +3456,7 @@
           <a:p>
             <a:fld id="{0E9C1207-8C0F-4467-9EE0-B66820579898}" type="datetimeFigureOut">
               <a:rPr lang="LID4096" smtClean="0"/>
-              <a:t>09/09/2023</a:t>
+              <a:t>09/10/2023</a:t>
             </a:fld>
             <a:endParaRPr lang="LID4096"/>
           </a:p>
@@ -3722,7 +3745,7 @@
           <a:p>
             <a:fld id="{0E9C1207-8C0F-4467-9EE0-B66820579898}" type="datetimeFigureOut">
               <a:rPr lang="LID4096" smtClean="0"/>
-              <a:t>09/09/2023</a:t>
+              <a:t>09/10/2023</a:t>
             </a:fld>
             <a:endParaRPr lang="LID4096"/>
           </a:p>
@@ -3965,7 +3988,7 @@
           <a:p>
             <a:fld id="{0E9C1207-8C0F-4467-9EE0-B66820579898}" type="datetimeFigureOut">
               <a:rPr lang="LID4096" smtClean="0"/>
-              <a:t>09/09/2023</a:t>
+              <a:t>09/10/2023</a:t>
             </a:fld>
             <a:endParaRPr lang="LID4096"/>
           </a:p>
@@ -4834,7 +4857,7 @@
         </p:nvSpPr>
         <p:spPr>
           <a:xfrm>
-            <a:off x="4103331" y="2644063"/>
+            <a:off x="4103331" y="2619570"/>
             <a:ext cx="3985337" cy="1754326"/>
           </a:xfrm>
           <a:prstGeom prst="rect">
@@ -4915,6 +4938,42 @@
             <a:r>
               <a:rPr lang="en-US" dirty="0"/>
               <a:t>Google Authentication</a:t>
+            </a:r>
+          </a:p>
+        </p:txBody>
+      </p:sp>
+      <p:sp>
+        <p:nvSpPr>
+          <p:cNvPr id="3" name="TextBox 2">
+            <a:extLst>
+              <a:ext uri="{FF2B5EF4-FFF2-40B4-BE49-F238E27FC236}">
+                <a16:creationId xmlns:a16="http://schemas.microsoft.com/office/drawing/2014/main" id="{BF61434D-6336-DC9F-FAEA-BD6CC3B53D15}"/>
+              </a:ext>
+            </a:extLst>
+          </p:cNvPr>
+          <p:cNvSpPr txBox="1"/>
+          <p:nvPr/>
+        </p:nvSpPr>
+        <p:spPr>
+          <a:xfrm>
+            <a:off x="4103331" y="937727"/>
+            <a:ext cx="3985337" cy="369332"/>
+          </a:xfrm>
+          <a:prstGeom prst="rect">
+            <a:avLst/>
+          </a:prstGeom>
+          <a:noFill/>
+        </p:spPr>
+        <p:txBody>
+          <a:bodyPr wrap="square" rtlCol="0">
+            <a:spAutoFit/>
+          </a:bodyPr>
+          <a:lstStyle/>
+          <a:p>
+            <a:pPr algn="ctr"/>
+            <a:r>
+              <a:rPr lang="en-US" dirty="0"/>
+              <a:t>Sign Up</a:t>
             </a:r>
           </a:p>
         </p:txBody>

</xml_diff>

<commit_message>
added animation to dashboard
</commit_message>
<xml_diff>
--- a/developers/App_Layout.pptx
+++ b/developers/App_Layout.pptx
@@ -9,7 +9,8 @@
     <p:sldId id="257" r:id="rId3"/>
     <p:sldId id="258" r:id="rId4"/>
     <p:sldId id="259" r:id="rId5"/>
-    <p:sldId id="260" r:id="rId6"/>
+    <p:sldId id="261" r:id="rId6"/>
+    <p:sldId id="260" r:id="rId7"/>
   </p:sldIdLst>
   <p:sldSz cx="12192000" cy="6858000"/>
   <p:notesSz cx="6858000" cy="9144000"/>
@@ -119,7 +120,7 @@
 <file path=ppt/revisionInfo.xml><?xml version="1.0" encoding="utf-8"?>
 <p1510:revInfo xmlns:a="http://schemas.openxmlformats.org/drawingml/2006/main" xmlns:r="http://schemas.openxmlformats.org/officeDocument/2006/relationships" xmlns:p1510="http://schemas.microsoft.com/office/powerpoint/2015/10/main">
   <p1510:revLst>
-    <p1510:client id="{94908476-4F76-4955-B75C-9D6AAD0C10BE}" v="29" dt="2023-09-10T12:30:47.445"/>
+    <p1510:client id="{94908476-4F76-4955-B75C-9D6AAD0C10BE}" v="128" dt="2023-09-13T17:35:15.732"/>
   </p1510:revLst>
 </p1510:revInfo>
 </file>
@@ -129,7 +130,7 @@
   <pc:docChgLst>
     <pc:chgData name="HASHAK24" userId="adc0dbee-d402-424e-96ab-936e86920f86" providerId="ADAL" clId="{94908476-4F76-4955-B75C-9D6AAD0C10BE}"/>
     <pc:docChg chg="undo redo custSel addSld delSld modSld">
-      <pc:chgData name="HASHAK24" userId="adc0dbee-d402-424e-96ab-936e86920f86" providerId="ADAL" clId="{94908476-4F76-4955-B75C-9D6AAD0C10BE}" dt="2023-09-10T12:30:49.624" v="69" actId="20577"/>
+      <pc:chgData name="HASHAK24" userId="adc0dbee-d402-424e-96ab-936e86920f86" providerId="ADAL" clId="{94908476-4F76-4955-B75C-9D6AAD0C10BE}" dt="2023-09-13T17:35:34.836" v="403" actId="20577"/>
       <pc:docMkLst>
         <pc:docMk/>
       </pc:docMkLst>
@@ -186,6 +187,157 @@
             <ac:spMk id="3" creationId="{BF61434D-6336-DC9F-FAEA-BD6CC3B53D15}"/>
           </ac:spMkLst>
         </pc:spChg>
+      </pc:sldChg>
+      <pc:sldChg chg="addSp delSp modSp mod">
+        <pc:chgData name="HASHAK24" userId="adc0dbee-d402-424e-96ab-936e86920f86" providerId="ADAL" clId="{94908476-4F76-4955-B75C-9D6AAD0C10BE}" dt="2023-09-13T17:35:34.836" v="403" actId="20577"/>
+        <pc:sldMkLst>
+          <pc:docMk/>
+          <pc:sldMk cId="2915010406" sldId="259"/>
+        </pc:sldMkLst>
+        <pc:spChg chg="mod">
+          <ac:chgData name="HASHAK24" userId="adc0dbee-d402-424e-96ab-936e86920f86" providerId="ADAL" clId="{94908476-4F76-4955-B75C-9D6AAD0C10BE}" dt="2023-09-13T17:34:51.876" v="357" actId="20577"/>
+          <ac:spMkLst>
+            <pc:docMk/>
+            <pc:sldMk cId="2915010406" sldId="259"/>
+            <ac:spMk id="3" creationId="{2B2DD87D-C487-1002-8B50-58FBD9A5A212}"/>
+          </ac:spMkLst>
+        </pc:spChg>
+        <pc:spChg chg="del mod">
+          <ac:chgData name="HASHAK24" userId="adc0dbee-d402-424e-96ab-936e86920f86" providerId="ADAL" clId="{94908476-4F76-4955-B75C-9D6AAD0C10BE}" dt="2023-09-13T16:59:22.422" v="74" actId="478"/>
+          <ac:spMkLst>
+            <pc:docMk/>
+            <pc:sldMk cId="2915010406" sldId="259"/>
+            <ac:spMk id="6" creationId="{AE54FD78-00E9-1873-20B5-E55BD58D0CBB}"/>
+          </ac:spMkLst>
+        </pc:spChg>
+        <pc:spChg chg="mod">
+          <ac:chgData name="HASHAK24" userId="adc0dbee-d402-424e-96ab-936e86920f86" providerId="ADAL" clId="{94908476-4F76-4955-B75C-9D6AAD0C10BE}" dt="2023-09-13T16:59:18.430" v="72" actId="1076"/>
+          <ac:spMkLst>
+            <pc:docMk/>
+            <pc:sldMk cId="2915010406" sldId="259"/>
+            <ac:spMk id="13" creationId="{18CA5FB5-8083-B575-ED63-4593A9C00075}"/>
+          </ac:spMkLst>
+        </pc:spChg>
+        <pc:spChg chg="mod">
+          <ac:chgData name="HASHAK24" userId="adc0dbee-d402-424e-96ab-936e86920f86" providerId="ADAL" clId="{94908476-4F76-4955-B75C-9D6AAD0C10BE}" dt="2023-09-13T17:33:16.827" v="264" actId="1076"/>
+          <ac:spMkLst>
+            <pc:docMk/>
+            <pc:sldMk cId="2915010406" sldId="259"/>
+            <ac:spMk id="14" creationId="{BA412493-0670-1FAD-C045-72C4174368A8}"/>
+          </ac:spMkLst>
+        </pc:spChg>
+        <pc:spChg chg="mod">
+          <ac:chgData name="HASHAK24" userId="adc0dbee-d402-424e-96ab-936e86920f86" providerId="ADAL" clId="{94908476-4F76-4955-B75C-9D6AAD0C10BE}" dt="2023-09-13T17:33:18.740" v="265" actId="1076"/>
+          <ac:spMkLst>
+            <pc:docMk/>
+            <pc:sldMk cId="2915010406" sldId="259"/>
+            <ac:spMk id="15" creationId="{01D1E2F4-6C8E-118C-DC55-A30737DDD45E}"/>
+          </ac:spMkLst>
+        </pc:spChg>
+        <pc:spChg chg="add mod">
+          <ac:chgData name="HASHAK24" userId="adc0dbee-d402-424e-96ab-936e86920f86" providerId="ADAL" clId="{94908476-4F76-4955-B75C-9D6AAD0C10BE}" dt="2023-09-13T17:05:51.228" v="258" actId="20577"/>
+          <ac:spMkLst>
+            <pc:docMk/>
+            <pc:sldMk cId="2915010406" sldId="259"/>
+            <ac:spMk id="29" creationId="{3D0ABCC4-2366-AF41-A5BF-6900B789A9E1}"/>
+          </ac:spMkLst>
+        </pc:spChg>
+        <pc:spChg chg="add mod">
+          <ac:chgData name="HASHAK24" userId="adc0dbee-d402-424e-96ab-936e86920f86" providerId="ADAL" clId="{94908476-4F76-4955-B75C-9D6AAD0C10BE}" dt="2023-09-13T17:35:34.836" v="403" actId="20577"/>
+          <ac:spMkLst>
+            <pc:docMk/>
+            <pc:sldMk cId="2915010406" sldId="259"/>
+            <ac:spMk id="36" creationId="{5C5914F2-5928-3AEA-8319-4694C1537876}"/>
+          </ac:spMkLst>
+        </pc:spChg>
+        <pc:graphicFrameChg chg="mod">
+          <ac:chgData name="HASHAK24" userId="adc0dbee-d402-424e-96ab-936e86920f86" providerId="ADAL" clId="{94908476-4F76-4955-B75C-9D6AAD0C10BE}" dt="2023-09-13T16:59:18.430" v="72" actId="1076"/>
+          <ac:graphicFrameMkLst>
+            <pc:docMk/>
+            <pc:sldMk cId="2915010406" sldId="259"/>
+            <ac:graphicFrameMk id="19" creationId="{014D4CDA-43FD-1624-0927-C73B790E3317}"/>
+          </ac:graphicFrameMkLst>
+        </pc:graphicFrameChg>
+        <pc:graphicFrameChg chg="add mod">
+          <ac:chgData name="HASHAK24" userId="adc0dbee-d402-424e-96ab-936e86920f86" providerId="ADAL" clId="{94908476-4F76-4955-B75C-9D6AAD0C10BE}" dt="2023-09-13T17:03:29.916" v="203" actId="20577"/>
+          <ac:graphicFrameMkLst>
+            <pc:docMk/>
+            <pc:sldMk cId="2915010406" sldId="259"/>
+            <ac:graphicFrameMk id="25" creationId="{68FA0E66-9755-8B6C-1577-9F47F800B67D}"/>
+          </ac:graphicFrameMkLst>
+        </pc:graphicFrameChg>
+        <pc:graphicFrameChg chg="add mod">
+          <ac:chgData name="HASHAK24" userId="adc0dbee-d402-424e-96ab-936e86920f86" providerId="ADAL" clId="{94908476-4F76-4955-B75C-9D6AAD0C10BE}" dt="2023-09-13T17:05:05.515" v="248" actId="20577"/>
+          <ac:graphicFrameMkLst>
+            <pc:docMk/>
+            <pc:sldMk cId="2915010406" sldId="259"/>
+            <ac:graphicFrameMk id="28" creationId="{97CEECE4-E282-DF41-A098-9F67DA08F99A}"/>
+          </ac:graphicFrameMkLst>
+        </pc:graphicFrameChg>
+        <pc:picChg chg="add del mod">
+          <ac:chgData name="HASHAK24" userId="adc0dbee-d402-424e-96ab-936e86920f86" providerId="ADAL" clId="{94908476-4F76-4955-B75C-9D6AAD0C10BE}" dt="2023-09-13T17:01:25.043" v="94" actId="478"/>
+          <ac:picMkLst>
+            <pc:docMk/>
+            <pc:sldMk cId="2915010406" sldId="259"/>
+            <ac:picMk id="20" creationId="{31ABCFFA-06B8-D334-AC57-B2235FB58994}"/>
+          </ac:picMkLst>
+        </pc:picChg>
+        <pc:picChg chg="add mod">
+          <ac:chgData name="HASHAK24" userId="adc0dbee-d402-424e-96ab-936e86920f86" providerId="ADAL" clId="{94908476-4F76-4955-B75C-9D6AAD0C10BE}" dt="2023-09-13T17:06:02.155" v="259" actId="1076"/>
+          <ac:picMkLst>
+            <pc:docMk/>
+            <pc:sldMk cId="2915010406" sldId="259"/>
+            <ac:picMk id="22" creationId="{FAC5115A-4C7A-A9F0-976B-7AB8277B5B5A}"/>
+          </ac:picMkLst>
+        </pc:picChg>
+        <pc:cxnChg chg="add mod">
+          <ac:chgData name="HASHAK24" userId="adc0dbee-d402-424e-96ab-936e86920f86" providerId="ADAL" clId="{94908476-4F76-4955-B75C-9D6AAD0C10BE}" dt="2023-09-13T17:00:28.389" v="87" actId="14100"/>
+          <ac:cxnSpMkLst>
+            <pc:docMk/>
+            <pc:sldMk cId="2915010406" sldId="259"/>
+            <ac:cxnSpMk id="4" creationId="{64DF816F-3964-81EF-3956-2B4FBC13C484}"/>
+          </ac:cxnSpMkLst>
+        </pc:cxnChg>
+        <pc:cxnChg chg="add mod">
+          <ac:chgData name="HASHAK24" userId="adc0dbee-d402-424e-96ab-936e86920f86" providerId="ADAL" clId="{94908476-4F76-4955-B75C-9D6AAD0C10BE}" dt="2023-09-13T17:00:31.491" v="88" actId="14100"/>
+          <ac:cxnSpMkLst>
+            <pc:docMk/>
+            <pc:sldMk cId="2915010406" sldId="259"/>
+            <ac:cxnSpMk id="8" creationId="{F198A5AA-F831-8822-16D4-CD843781E787}"/>
+          </ac:cxnSpMkLst>
+        </pc:cxnChg>
+        <pc:cxnChg chg="add">
+          <ac:chgData name="HASHAK24" userId="adc0dbee-d402-424e-96ab-936e86920f86" providerId="ADAL" clId="{94908476-4F76-4955-B75C-9D6AAD0C10BE}" dt="2023-09-13T17:01:01.621" v="89" actId="11529"/>
+          <ac:cxnSpMkLst>
+            <pc:docMk/>
+            <pc:sldMk cId="2915010406" sldId="259"/>
+            <ac:cxnSpMk id="17" creationId="{19679D4F-EB08-E27C-8FA3-373EF3814CA2}"/>
+          </ac:cxnSpMkLst>
+        </pc:cxnChg>
+        <pc:cxnChg chg="add">
+          <ac:chgData name="HASHAK24" userId="adc0dbee-d402-424e-96ab-936e86920f86" providerId="ADAL" clId="{94908476-4F76-4955-B75C-9D6AAD0C10BE}" dt="2023-09-13T17:33:03.718" v="262" actId="11529"/>
+          <ac:cxnSpMkLst>
+            <pc:docMk/>
+            <pc:sldMk cId="2915010406" sldId="259"/>
+            <ac:cxnSpMk id="31" creationId="{8A58652B-6D7F-E599-1E0A-8C39D551EB89}"/>
+          </ac:cxnSpMkLst>
+        </pc:cxnChg>
+        <pc:cxnChg chg="add">
+          <ac:chgData name="HASHAK24" userId="adc0dbee-d402-424e-96ab-936e86920f86" providerId="ADAL" clId="{94908476-4F76-4955-B75C-9D6AAD0C10BE}" dt="2023-09-13T17:33:10.397" v="263" actId="11529"/>
+          <ac:cxnSpMkLst>
+            <pc:docMk/>
+            <pc:sldMk cId="2915010406" sldId="259"/>
+            <ac:cxnSpMk id="33" creationId="{F868CE2B-6640-C116-9494-6F1430C12E3B}"/>
+          </ac:cxnSpMkLst>
+        </pc:cxnChg>
+        <pc:cxnChg chg="add">
+          <ac:chgData name="HASHAK24" userId="adc0dbee-d402-424e-96ab-936e86920f86" providerId="ADAL" clId="{94908476-4F76-4955-B75C-9D6AAD0C10BE}" dt="2023-09-13T17:35:11.790" v="358" actId="11529"/>
+          <ac:cxnSpMkLst>
+            <pc:docMk/>
+            <pc:sldMk cId="2915010406" sldId="259"/>
+            <ac:cxnSpMk id="35" creationId="{B98CDEC3-041E-31A2-5D5E-51012C01DC06}"/>
+          </ac:cxnSpMkLst>
+        </pc:cxnChg>
       </pc:sldChg>
       <pc:sldChg chg="addSp delSp modSp add del mod">
         <pc:chgData name="HASHAK24" userId="adc0dbee-d402-424e-96ab-936e86920f86" providerId="ADAL" clId="{94908476-4F76-4955-B75C-9D6AAD0C10BE}" dt="2023-09-09T15:20:27.205" v="54" actId="47"/>
@@ -390,6 +542,165 @@
             <pc:docMk/>
             <pc:sldMk cId="3993883768" sldId="260"/>
             <ac:cxnSpMk id="8" creationId="{49D4FC0E-4F55-0466-5927-1BD5C4C03AC5}"/>
+          </ac:cxnSpMkLst>
+        </pc:cxnChg>
+      </pc:sldChg>
+      <pc:sldChg chg="addSp delSp modSp add mod">
+        <pc:chgData name="HASHAK24" userId="adc0dbee-d402-424e-96ab-936e86920f86" providerId="ADAL" clId="{94908476-4F76-4955-B75C-9D6AAD0C10BE}" dt="2023-09-13T17:34:38.061" v="322" actId="20577"/>
+        <pc:sldMkLst>
+          <pc:docMk/>
+          <pc:sldMk cId="2405697313" sldId="261"/>
+        </pc:sldMkLst>
+        <pc:spChg chg="del">
+          <ac:chgData name="HASHAK24" userId="adc0dbee-d402-424e-96ab-936e86920f86" providerId="ADAL" clId="{94908476-4F76-4955-B75C-9D6AAD0C10BE}" dt="2023-09-13T17:33:23.216" v="267" actId="478"/>
+          <ac:spMkLst>
+            <pc:docMk/>
+            <pc:sldMk cId="2405697313" sldId="261"/>
+            <ac:spMk id="3" creationId="{2B2DD87D-C487-1002-8B50-58FBD9A5A212}"/>
+          </ac:spMkLst>
+        </pc:spChg>
+        <pc:spChg chg="add mod">
+          <ac:chgData name="HASHAK24" userId="adc0dbee-d402-424e-96ab-936e86920f86" providerId="ADAL" clId="{94908476-4F76-4955-B75C-9D6AAD0C10BE}" dt="2023-09-13T17:34:38.061" v="322" actId="20577"/>
+          <ac:spMkLst>
+            <pc:docMk/>
+            <pc:sldMk cId="2405697313" sldId="261"/>
+            <ac:spMk id="7" creationId="{6FCB24E6-C849-D23C-A485-CC978A368B4E}"/>
+          </ac:spMkLst>
+        </pc:spChg>
+        <pc:spChg chg="del">
+          <ac:chgData name="HASHAK24" userId="adc0dbee-d402-424e-96ab-936e86920f86" providerId="ADAL" clId="{94908476-4F76-4955-B75C-9D6AAD0C10BE}" dt="2023-09-13T17:33:23.216" v="267" actId="478"/>
+          <ac:spMkLst>
+            <pc:docMk/>
+            <pc:sldMk cId="2405697313" sldId="261"/>
+            <ac:spMk id="11" creationId="{4F567C11-A171-0440-00DC-40ECCDEC77C0}"/>
+          </ac:spMkLst>
+        </pc:spChg>
+        <pc:spChg chg="del">
+          <ac:chgData name="HASHAK24" userId="adc0dbee-d402-424e-96ab-936e86920f86" providerId="ADAL" clId="{94908476-4F76-4955-B75C-9D6AAD0C10BE}" dt="2023-09-13T17:33:23.216" v="267" actId="478"/>
+          <ac:spMkLst>
+            <pc:docMk/>
+            <pc:sldMk cId="2405697313" sldId="261"/>
+            <ac:spMk id="13" creationId="{18CA5FB5-8083-B575-ED63-4593A9C00075}"/>
+          </ac:spMkLst>
+        </pc:spChg>
+        <pc:spChg chg="del">
+          <ac:chgData name="HASHAK24" userId="adc0dbee-d402-424e-96ab-936e86920f86" providerId="ADAL" clId="{94908476-4F76-4955-B75C-9D6AAD0C10BE}" dt="2023-09-13T17:33:23.216" v="267" actId="478"/>
+          <ac:spMkLst>
+            <pc:docMk/>
+            <pc:sldMk cId="2405697313" sldId="261"/>
+            <ac:spMk id="14" creationId="{BA412493-0670-1FAD-C045-72C4174368A8}"/>
+          </ac:spMkLst>
+        </pc:spChg>
+        <pc:spChg chg="del">
+          <ac:chgData name="HASHAK24" userId="adc0dbee-d402-424e-96ab-936e86920f86" providerId="ADAL" clId="{94908476-4F76-4955-B75C-9D6AAD0C10BE}" dt="2023-09-13T17:33:23.216" v="267" actId="478"/>
+          <ac:spMkLst>
+            <pc:docMk/>
+            <pc:sldMk cId="2405697313" sldId="261"/>
+            <ac:spMk id="15" creationId="{01D1E2F4-6C8E-118C-DC55-A30737DDD45E}"/>
+          </ac:spMkLst>
+        </pc:spChg>
+        <pc:spChg chg="del">
+          <ac:chgData name="HASHAK24" userId="adc0dbee-d402-424e-96ab-936e86920f86" providerId="ADAL" clId="{94908476-4F76-4955-B75C-9D6AAD0C10BE}" dt="2023-09-13T17:33:23.216" v="267" actId="478"/>
+          <ac:spMkLst>
+            <pc:docMk/>
+            <pc:sldMk cId="2405697313" sldId="261"/>
+            <ac:spMk id="29" creationId="{3D0ABCC4-2366-AF41-A5BF-6900B789A9E1}"/>
+          </ac:spMkLst>
+        </pc:spChg>
+        <pc:graphicFrameChg chg="del">
+          <ac:chgData name="HASHAK24" userId="adc0dbee-d402-424e-96ab-936e86920f86" providerId="ADAL" clId="{94908476-4F76-4955-B75C-9D6AAD0C10BE}" dt="2023-09-13T17:33:23.216" v="267" actId="478"/>
+          <ac:graphicFrameMkLst>
+            <pc:docMk/>
+            <pc:sldMk cId="2405697313" sldId="261"/>
+            <ac:graphicFrameMk id="19" creationId="{014D4CDA-43FD-1624-0927-C73B790E3317}"/>
+          </ac:graphicFrameMkLst>
+        </pc:graphicFrameChg>
+        <pc:graphicFrameChg chg="del">
+          <ac:chgData name="HASHAK24" userId="adc0dbee-d402-424e-96ab-936e86920f86" providerId="ADAL" clId="{94908476-4F76-4955-B75C-9D6AAD0C10BE}" dt="2023-09-13T17:33:23.216" v="267" actId="478"/>
+          <ac:graphicFrameMkLst>
+            <pc:docMk/>
+            <pc:sldMk cId="2405697313" sldId="261"/>
+            <ac:graphicFrameMk id="25" creationId="{68FA0E66-9755-8B6C-1577-9F47F800B67D}"/>
+          </ac:graphicFrameMkLst>
+        </pc:graphicFrameChg>
+        <pc:graphicFrameChg chg="del">
+          <ac:chgData name="HASHAK24" userId="adc0dbee-d402-424e-96ab-936e86920f86" providerId="ADAL" clId="{94908476-4F76-4955-B75C-9D6AAD0C10BE}" dt="2023-09-13T17:33:23.216" v="267" actId="478"/>
+          <ac:graphicFrameMkLst>
+            <pc:docMk/>
+            <pc:sldMk cId="2405697313" sldId="261"/>
+            <ac:graphicFrameMk id="28" creationId="{97CEECE4-E282-DF41-A098-9F67DA08F99A}"/>
+          </ac:graphicFrameMkLst>
+        </pc:graphicFrameChg>
+        <pc:picChg chg="del">
+          <ac:chgData name="HASHAK24" userId="adc0dbee-d402-424e-96ab-936e86920f86" providerId="ADAL" clId="{94908476-4F76-4955-B75C-9D6AAD0C10BE}" dt="2023-09-13T17:33:23.216" v="267" actId="478"/>
+          <ac:picMkLst>
+            <pc:docMk/>
+            <pc:sldMk cId="2405697313" sldId="261"/>
+            <ac:picMk id="5" creationId="{25A12393-9C15-996E-2D9C-4B26D7C54625}"/>
+          </ac:picMkLst>
+        </pc:picChg>
+        <pc:picChg chg="add">
+          <ac:chgData name="HASHAK24" userId="adc0dbee-d402-424e-96ab-936e86920f86" providerId="ADAL" clId="{94908476-4F76-4955-B75C-9D6AAD0C10BE}" dt="2023-09-13T17:33:23.549" v="268" actId="22"/>
+          <ac:picMkLst>
+            <pc:docMk/>
+            <pc:sldMk cId="2405697313" sldId="261"/>
+            <ac:picMk id="6" creationId="{AE8D5274-0A66-98C3-86DC-9C784832A265}"/>
+          </ac:picMkLst>
+        </pc:picChg>
+        <pc:picChg chg="del">
+          <ac:chgData name="HASHAK24" userId="adc0dbee-d402-424e-96ab-936e86920f86" providerId="ADAL" clId="{94908476-4F76-4955-B75C-9D6AAD0C10BE}" dt="2023-09-13T17:33:23.216" v="267" actId="478"/>
+          <ac:picMkLst>
+            <pc:docMk/>
+            <pc:sldMk cId="2405697313" sldId="261"/>
+            <ac:picMk id="10" creationId="{9F98282D-BB2F-201D-D585-882C5F46E565}"/>
+          </ac:picMkLst>
+        </pc:picChg>
+        <pc:picChg chg="del">
+          <ac:chgData name="HASHAK24" userId="adc0dbee-d402-424e-96ab-936e86920f86" providerId="ADAL" clId="{94908476-4F76-4955-B75C-9D6AAD0C10BE}" dt="2023-09-13T17:33:23.216" v="267" actId="478"/>
+          <ac:picMkLst>
+            <pc:docMk/>
+            <pc:sldMk cId="2405697313" sldId="261"/>
+            <ac:picMk id="22" creationId="{FAC5115A-4C7A-A9F0-976B-7AB8277B5B5A}"/>
+          </ac:picMkLst>
+        </pc:picChg>
+        <pc:cxnChg chg="del">
+          <ac:chgData name="HASHAK24" userId="adc0dbee-d402-424e-96ab-936e86920f86" providerId="ADAL" clId="{94908476-4F76-4955-B75C-9D6AAD0C10BE}" dt="2023-09-13T17:33:23.216" v="267" actId="478"/>
+          <ac:cxnSpMkLst>
+            <pc:docMk/>
+            <pc:sldMk cId="2405697313" sldId="261"/>
+            <ac:cxnSpMk id="4" creationId="{64DF816F-3964-81EF-3956-2B4FBC13C484}"/>
+          </ac:cxnSpMkLst>
+        </pc:cxnChg>
+        <pc:cxnChg chg="del">
+          <ac:chgData name="HASHAK24" userId="adc0dbee-d402-424e-96ab-936e86920f86" providerId="ADAL" clId="{94908476-4F76-4955-B75C-9D6AAD0C10BE}" dt="2023-09-13T17:33:23.216" v="267" actId="478"/>
+          <ac:cxnSpMkLst>
+            <pc:docMk/>
+            <pc:sldMk cId="2405697313" sldId="261"/>
+            <ac:cxnSpMk id="8" creationId="{F198A5AA-F831-8822-16D4-CD843781E787}"/>
+          </ac:cxnSpMkLst>
+        </pc:cxnChg>
+        <pc:cxnChg chg="del">
+          <ac:chgData name="HASHAK24" userId="adc0dbee-d402-424e-96ab-936e86920f86" providerId="ADAL" clId="{94908476-4F76-4955-B75C-9D6AAD0C10BE}" dt="2023-09-13T17:33:23.216" v="267" actId="478"/>
+          <ac:cxnSpMkLst>
+            <pc:docMk/>
+            <pc:sldMk cId="2405697313" sldId="261"/>
+            <ac:cxnSpMk id="17" creationId="{19679D4F-EB08-E27C-8FA3-373EF3814CA2}"/>
+          </ac:cxnSpMkLst>
+        </pc:cxnChg>
+        <pc:cxnChg chg="del">
+          <ac:chgData name="HASHAK24" userId="adc0dbee-d402-424e-96ab-936e86920f86" providerId="ADAL" clId="{94908476-4F76-4955-B75C-9D6AAD0C10BE}" dt="2023-09-13T17:33:23.216" v="267" actId="478"/>
+          <ac:cxnSpMkLst>
+            <pc:docMk/>
+            <pc:sldMk cId="2405697313" sldId="261"/>
+            <ac:cxnSpMk id="31" creationId="{8A58652B-6D7F-E599-1E0A-8C39D551EB89}"/>
+          </ac:cxnSpMkLst>
+        </pc:cxnChg>
+        <pc:cxnChg chg="del">
+          <ac:chgData name="HASHAK24" userId="adc0dbee-d402-424e-96ab-936e86920f86" providerId="ADAL" clId="{94908476-4F76-4955-B75C-9D6AAD0C10BE}" dt="2023-09-13T17:33:23.216" v="267" actId="478"/>
+          <ac:cxnSpMkLst>
+            <pc:docMk/>
+            <pc:sldMk cId="2405697313" sldId="261"/>
+            <ac:cxnSpMk id="33" creationId="{F868CE2B-6640-C116-9494-6F1430C12E3B}"/>
           </ac:cxnSpMkLst>
         </pc:cxnChg>
       </pc:sldChg>
@@ -611,7 +922,850 @@
 </c:chartSpace>
 </file>
 
+<file path=ppt/charts/chart2.xml><?xml version="1.0" encoding="utf-8"?>
+<c:chartSpace xmlns:c="http://schemas.openxmlformats.org/drawingml/2006/chart" xmlns:a="http://schemas.openxmlformats.org/drawingml/2006/main" xmlns:r="http://schemas.openxmlformats.org/officeDocument/2006/relationships" xmlns:c16r2="http://schemas.microsoft.com/office/drawing/2015/06/chart">
+  <c:date1904 val="0"/>
+  <c:lang val="en-US"/>
+  <c:roundedCorners val="0"/>
+  <mc:AlternateContent xmlns:mc="http://schemas.openxmlformats.org/markup-compatibility/2006">
+    <mc:Choice xmlns:c14="http://schemas.microsoft.com/office/drawing/2007/8/2/chart" Requires="c14">
+      <c14:style val="102"/>
+    </mc:Choice>
+    <mc:Fallback>
+      <c:style val="2"/>
+    </mc:Fallback>
+  </mc:AlternateContent>
+  <c:chart>
+    <c:title>
+      <c:tx>
+        <c:rich>
+          <a:bodyPr rot="0" spcFirstLastPara="1" vertOverflow="ellipsis" vert="horz" wrap="square" anchor="ctr" anchorCtr="1"/>
+          <a:lstStyle/>
+          <a:p>
+            <a:pPr>
+              <a:defRPr sz="1862" b="0" i="0" u="none" strike="noStrike" kern="1200" spc="0" baseline="0">
+                <a:solidFill>
+                  <a:schemeClr val="tx1">
+                    <a:lumMod val="65000"/>
+                    <a:lumOff val="35000"/>
+                  </a:schemeClr>
+                </a:solidFill>
+                <a:latin typeface="+mn-lt"/>
+                <a:ea typeface="+mn-ea"/>
+                <a:cs typeface="+mn-cs"/>
+              </a:defRPr>
+            </a:pPr>
+            <a:r>
+              <a:rPr lang="en-US" dirty="0"/>
+              <a:t>Income</a:t>
+            </a:r>
+            <a:r>
+              <a:rPr lang="en-US" baseline="0" dirty="0"/>
+              <a:t> &amp; Outcome by Month</a:t>
+            </a:r>
+            <a:endParaRPr lang="en-US" dirty="0"/>
+          </a:p>
+        </c:rich>
+      </c:tx>
+      <c:overlay val="0"/>
+      <c:spPr>
+        <a:noFill/>
+        <a:ln>
+          <a:noFill/>
+        </a:ln>
+        <a:effectLst/>
+      </c:spPr>
+      <c:txPr>
+        <a:bodyPr rot="0" spcFirstLastPara="1" vertOverflow="ellipsis" vert="horz" wrap="square" anchor="ctr" anchorCtr="1"/>
+        <a:lstStyle/>
+        <a:p>
+          <a:pPr>
+            <a:defRPr sz="1862" b="0" i="0" u="none" strike="noStrike" kern="1200" spc="0" baseline="0">
+              <a:solidFill>
+                <a:schemeClr val="tx1">
+                  <a:lumMod val="65000"/>
+                  <a:lumOff val="35000"/>
+                </a:schemeClr>
+              </a:solidFill>
+              <a:latin typeface="+mn-lt"/>
+              <a:ea typeface="+mn-ea"/>
+              <a:cs typeface="+mn-cs"/>
+            </a:defRPr>
+          </a:pPr>
+          <a:endParaRPr lang="LID4096"/>
+        </a:p>
+      </c:txPr>
+    </c:title>
+    <c:autoTitleDeleted val="0"/>
+    <c:plotArea>
+      <c:layout/>
+      <c:barChart>
+        <c:barDir val="col"/>
+        <c:grouping val="clustered"/>
+        <c:varyColors val="0"/>
+        <c:ser>
+          <c:idx val="0"/>
+          <c:order val="0"/>
+          <c:tx>
+            <c:strRef>
+              <c:f>Sheet1!$B$1</c:f>
+              <c:strCache>
+                <c:ptCount val="1"/>
+                <c:pt idx="0">
+                  <c:v>Series 1</c:v>
+                </c:pt>
+              </c:strCache>
+            </c:strRef>
+          </c:tx>
+          <c:spPr>
+            <a:solidFill>
+              <a:schemeClr val="accent1"/>
+            </a:solidFill>
+            <a:ln>
+              <a:noFill/>
+            </a:ln>
+            <a:effectLst/>
+          </c:spPr>
+          <c:invertIfNegative val="0"/>
+          <c:cat>
+            <c:strRef>
+              <c:f>Sheet1!$A$2:$A$5</c:f>
+              <c:strCache>
+                <c:ptCount val="4"/>
+                <c:pt idx="0">
+                  <c:v>January</c:v>
+                </c:pt>
+                <c:pt idx="1">
+                  <c:v>Febuary</c:v>
+                </c:pt>
+                <c:pt idx="2">
+                  <c:v>March</c:v>
+                </c:pt>
+                <c:pt idx="3">
+                  <c:v>April</c:v>
+                </c:pt>
+              </c:strCache>
+            </c:strRef>
+          </c:cat>
+          <c:val>
+            <c:numRef>
+              <c:f>Sheet1!$B$2:$B$5</c:f>
+              <c:numCache>
+                <c:formatCode>General</c:formatCode>
+                <c:ptCount val="4"/>
+                <c:pt idx="0">
+                  <c:v>4.3</c:v>
+                </c:pt>
+                <c:pt idx="1">
+                  <c:v>2.5</c:v>
+                </c:pt>
+                <c:pt idx="2">
+                  <c:v>3.5</c:v>
+                </c:pt>
+                <c:pt idx="3">
+                  <c:v>4.5</c:v>
+                </c:pt>
+              </c:numCache>
+            </c:numRef>
+          </c:val>
+          <c:extLst>
+            <c:ext xmlns:c16="http://schemas.microsoft.com/office/drawing/2014/chart" uri="{C3380CC4-5D6E-409C-BE32-E72D297353CC}">
+              <c16:uniqueId val="{00000000-9A0B-45F5-957A-856293B6A8AC}"/>
+            </c:ext>
+          </c:extLst>
+        </c:ser>
+        <c:ser>
+          <c:idx val="1"/>
+          <c:order val="1"/>
+          <c:tx>
+            <c:strRef>
+              <c:f>Sheet1!$C$1</c:f>
+              <c:strCache>
+                <c:ptCount val="1"/>
+                <c:pt idx="0">
+                  <c:v>Series 2</c:v>
+                </c:pt>
+              </c:strCache>
+            </c:strRef>
+          </c:tx>
+          <c:spPr>
+            <a:solidFill>
+              <a:schemeClr val="accent2"/>
+            </a:solidFill>
+            <a:ln>
+              <a:noFill/>
+            </a:ln>
+            <a:effectLst/>
+          </c:spPr>
+          <c:invertIfNegative val="0"/>
+          <c:cat>
+            <c:strRef>
+              <c:f>Sheet1!$A$2:$A$5</c:f>
+              <c:strCache>
+                <c:ptCount val="4"/>
+                <c:pt idx="0">
+                  <c:v>January</c:v>
+                </c:pt>
+                <c:pt idx="1">
+                  <c:v>Febuary</c:v>
+                </c:pt>
+                <c:pt idx="2">
+                  <c:v>March</c:v>
+                </c:pt>
+                <c:pt idx="3">
+                  <c:v>April</c:v>
+                </c:pt>
+              </c:strCache>
+            </c:strRef>
+          </c:cat>
+          <c:val>
+            <c:numRef>
+              <c:f>Sheet1!$C$2:$C$5</c:f>
+              <c:numCache>
+                <c:formatCode>General</c:formatCode>
+                <c:ptCount val="4"/>
+                <c:pt idx="0">
+                  <c:v>2.4</c:v>
+                </c:pt>
+                <c:pt idx="1">
+                  <c:v>4.4000000000000004</c:v>
+                </c:pt>
+                <c:pt idx="2">
+                  <c:v>1.8</c:v>
+                </c:pt>
+                <c:pt idx="3">
+                  <c:v>2.8</c:v>
+                </c:pt>
+              </c:numCache>
+            </c:numRef>
+          </c:val>
+          <c:extLst>
+            <c:ext xmlns:c16="http://schemas.microsoft.com/office/drawing/2014/chart" uri="{C3380CC4-5D6E-409C-BE32-E72D297353CC}">
+              <c16:uniqueId val="{00000001-9A0B-45F5-957A-856293B6A8AC}"/>
+            </c:ext>
+          </c:extLst>
+        </c:ser>
+        <c:dLbls>
+          <c:showLegendKey val="0"/>
+          <c:showVal val="0"/>
+          <c:showCatName val="0"/>
+          <c:showSerName val="0"/>
+          <c:showPercent val="0"/>
+          <c:showBubbleSize val="0"/>
+        </c:dLbls>
+        <c:gapWidth val="219"/>
+        <c:overlap val="-27"/>
+        <c:axId val="250600911"/>
+        <c:axId val="210976415"/>
+      </c:barChart>
+      <c:catAx>
+        <c:axId val="250600911"/>
+        <c:scaling>
+          <c:orientation val="minMax"/>
+        </c:scaling>
+        <c:delete val="0"/>
+        <c:axPos val="b"/>
+        <c:numFmt formatCode="General" sourceLinked="1"/>
+        <c:majorTickMark val="none"/>
+        <c:minorTickMark val="none"/>
+        <c:tickLblPos val="nextTo"/>
+        <c:spPr>
+          <a:noFill/>
+          <a:ln w="9525" cap="flat" cmpd="sng" algn="ctr">
+            <a:solidFill>
+              <a:schemeClr val="tx1">
+                <a:lumMod val="15000"/>
+                <a:lumOff val="85000"/>
+              </a:schemeClr>
+            </a:solidFill>
+            <a:round/>
+          </a:ln>
+          <a:effectLst/>
+        </c:spPr>
+        <c:txPr>
+          <a:bodyPr rot="-60000000" spcFirstLastPara="1" vertOverflow="ellipsis" vert="horz" wrap="square" anchor="ctr" anchorCtr="1"/>
+          <a:lstStyle/>
+          <a:p>
+            <a:pPr>
+              <a:defRPr sz="1197" b="0" i="0" u="none" strike="noStrike" kern="1200" baseline="0">
+                <a:solidFill>
+                  <a:schemeClr val="tx1">
+                    <a:lumMod val="65000"/>
+                    <a:lumOff val="35000"/>
+                  </a:schemeClr>
+                </a:solidFill>
+                <a:latin typeface="+mn-lt"/>
+                <a:ea typeface="+mn-ea"/>
+                <a:cs typeface="+mn-cs"/>
+              </a:defRPr>
+            </a:pPr>
+            <a:endParaRPr lang="LID4096"/>
+          </a:p>
+        </c:txPr>
+        <c:crossAx val="210976415"/>
+        <c:crosses val="autoZero"/>
+        <c:auto val="1"/>
+        <c:lblAlgn val="ctr"/>
+        <c:lblOffset val="100"/>
+        <c:noMultiLvlLbl val="0"/>
+      </c:catAx>
+      <c:valAx>
+        <c:axId val="210976415"/>
+        <c:scaling>
+          <c:orientation val="minMax"/>
+        </c:scaling>
+        <c:delete val="0"/>
+        <c:axPos val="l"/>
+        <c:majorGridlines>
+          <c:spPr>
+            <a:ln w="9525" cap="flat" cmpd="sng" algn="ctr">
+              <a:solidFill>
+                <a:schemeClr val="tx1">
+                  <a:lumMod val="15000"/>
+                  <a:lumOff val="85000"/>
+                </a:schemeClr>
+              </a:solidFill>
+              <a:round/>
+            </a:ln>
+            <a:effectLst/>
+          </c:spPr>
+        </c:majorGridlines>
+        <c:numFmt formatCode="General" sourceLinked="1"/>
+        <c:majorTickMark val="none"/>
+        <c:minorTickMark val="none"/>
+        <c:tickLblPos val="nextTo"/>
+        <c:spPr>
+          <a:noFill/>
+          <a:ln>
+            <a:noFill/>
+          </a:ln>
+          <a:effectLst/>
+        </c:spPr>
+        <c:txPr>
+          <a:bodyPr rot="-60000000" spcFirstLastPara="1" vertOverflow="ellipsis" vert="horz" wrap="square" anchor="ctr" anchorCtr="1"/>
+          <a:lstStyle/>
+          <a:p>
+            <a:pPr>
+              <a:defRPr sz="1197" b="0" i="0" u="none" strike="noStrike" kern="1200" baseline="0">
+                <a:solidFill>
+                  <a:schemeClr val="tx1">
+                    <a:lumMod val="65000"/>
+                    <a:lumOff val="35000"/>
+                  </a:schemeClr>
+                </a:solidFill>
+                <a:latin typeface="+mn-lt"/>
+                <a:ea typeface="+mn-ea"/>
+                <a:cs typeface="+mn-cs"/>
+              </a:defRPr>
+            </a:pPr>
+            <a:endParaRPr lang="LID4096"/>
+          </a:p>
+        </c:txPr>
+        <c:crossAx val="250600911"/>
+        <c:crosses val="autoZero"/>
+        <c:crossBetween val="between"/>
+      </c:valAx>
+      <c:spPr>
+        <a:noFill/>
+        <a:ln>
+          <a:noFill/>
+        </a:ln>
+        <a:effectLst/>
+      </c:spPr>
+    </c:plotArea>
+    <c:legend>
+      <c:legendPos val="b"/>
+      <c:overlay val="0"/>
+      <c:spPr>
+        <a:noFill/>
+        <a:ln>
+          <a:noFill/>
+        </a:ln>
+        <a:effectLst/>
+      </c:spPr>
+      <c:txPr>
+        <a:bodyPr rot="0" spcFirstLastPara="1" vertOverflow="ellipsis" vert="horz" wrap="square" anchor="ctr" anchorCtr="1"/>
+        <a:lstStyle/>
+        <a:p>
+          <a:pPr>
+            <a:defRPr sz="1197" b="0" i="0" u="none" strike="noStrike" kern="1200" baseline="0">
+              <a:solidFill>
+                <a:schemeClr val="tx1">
+                  <a:lumMod val="65000"/>
+                  <a:lumOff val="35000"/>
+                </a:schemeClr>
+              </a:solidFill>
+              <a:latin typeface="+mn-lt"/>
+              <a:ea typeface="+mn-ea"/>
+              <a:cs typeface="+mn-cs"/>
+            </a:defRPr>
+          </a:pPr>
+          <a:endParaRPr lang="LID4096"/>
+        </a:p>
+      </c:txPr>
+    </c:legend>
+    <c:plotVisOnly val="1"/>
+    <c:dispBlanksAs val="gap"/>
+    <c:extLst>
+      <c:ext xmlns:c16r3="http://schemas.microsoft.com/office/drawing/2017/03/chart" uri="{56B9EC1D-385E-4148-901F-78D8002777C0}">
+        <c16r3:dataDisplayOptions16>
+          <c16r3:dispNaAsBlank val="1"/>
+        </c16r3:dataDisplayOptions16>
+      </c:ext>
+    </c:extLst>
+    <c:showDLblsOverMax val="0"/>
+  </c:chart>
+  <c:spPr>
+    <a:noFill/>
+    <a:ln>
+      <a:noFill/>
+    </a:ln>
+    <a:effectLst/>
+  </c:spPr>
+  <c:txPr>
+    <a:bodyPr/>
+    <a:lstStyle/>
+    <a:p>
+      <a:pPr>
+        <a:defRPr/>
+      </a:pPr>
+      <a:endParaRPr lang="LID4096"/>
+    </a:p>
+  </c:txPr>
+  <c:externalData r:id="rId3">
+    <c:autoUpdate val="0"/>
+  </c:externalData>
+</c:chartSpace>
+</file>
+
+<file path=ppt/charts/chart3.xml><?xml version="1.0" encoding="utf-8"?>
+<c:chartSpace xmlns:c="http://schemas.openxmlformats.org/drawingml/2006/chart" xmlns:a="http://schemas.openxmlformats.org/drawingml/2006/main" xmlns:r="http://schemas.openxmlformats.org/officeDocument/2006/relationships" xmlns:c16r2="http://schemas.microsoft.com/office/drawing/2015/06/chart">
+  <c:date1904 val="0"/>
+  <c:lang val="en-US"/>
+  <c:roundedCorners val="0"/>
+  <mc:AlternateContent xmlns:mc="http://schemas.openxmlformats.org/markup-compatibility/2006">
+    <mc:Choice xmlns:c14="http://schemas.microsoft.com/office/drawing/2007/8/2/chart" Requires="c14">
+      <c14:style val="102"/>
+    </mc:Choice>
+    <mc:Fallback>
+      <c:style val="2"/>
+    </mc:Fallback>
+  </mc:AlternateContent>
+  <c:chart>
+    <c:title>
+      <c:tx>
+        <c:rich>
+          <a:bodyPr rot="0" spcFirstLastPara="1" vertOverflow="ellipsis" vert="horz" wrap="square" anchor="ctr" anchorCtr="1"/>
+          <a:lstStyle/>
+          <a:p>
+            <a:pPr>
+              <a:defRPr sz="1862" b="0" i="0" u="none" strike="noStrike" kern="1200" spc="0" baseline="0">
+                <a:solidFill>
+                  <a:schemeClr val="tx1">
+                    <a:lumMod val="65000"/>
+                    <a:lumOff val="35000"/>
+                  </a:schemeClr>
+                </a:solidFill>
+                <a:latin typeface="+mn-lt"/>
+                <a:ea typeface="+mn-ea"/>
+                <a:cs typeface="+mn-cs"/>
+              </a:defRPr>
+            </a:pPr>
+            <a:r>
+              <a:rPr lang="en-US" dirty="0"/>
+              <a:t>Monthly Balance by</a:t>
+            </a:r>
+            <a:r>
+              <a:rPr lang="en-US" baseline="0" dirty="0"/>
+              <a:t> Month</a:t>
+            </a:r>
+            <a:endParaRPr lang="en-US" dirty="0"/>
+          </a:p>
+        </c:rich>
+      </c:tx>
+      <c:overlay val="0"/>
+      <c:spPr>
+        <a:noFill/>
+        <a:ln>
+          <a:noFill/>
+        </a:ln>
+        <a:effectLst/>
+      </c:spPr>
+      <c:txPr>
+        <a:bodyPr rot="0" spcFirstLastPara="1" vertOverflow="ellipsis" vert="horz" wrap="square" anchor="ctr" anchorCtr="1"/>
+        <a:lstStyle/>
+        <a:p>
+          <a:pPr>
+            <a:defRPr sz="1862" b="0" i="0" u="none" strike="noStrike" kern="1200" spc="0" baseline="0">
+              <a:solidFill>
+                <a:schemeClr val="tx1">
+                  <a:lumMod val="65000"/>
+                  <a:lumOff val="35000"/>
+                </a:schemeClr>
+              </a:solidFill>
+              <a:latin typeface="+mn-lt"/>
+              <a:ea typeface="+mn-ea"/>
+              <a:cs typeface="+mn-cs"/>
+            </a:defRPr>
+          </a:pPr>
+          <a:endParaRPr lang="LID4096"/>
+        </a:p>
+      </c:txPr>
+    </c:title>
+    <c:autoTitleDeleted val="0"/>
+    <c:plotArea>
+      <c:layout/>
+      <c:areaChart>
+        <c:grouping val="standard"/>
+        <c:varyColors val="0"/>
+        <c:ser>
+          <c:idx val="0"/>
+          <c:order val="0"/>
+          <c:tx>
+            <c:strRef>
+              <c:f>Sheet1!$B$1</c:f>
+              <c:strCache>
+                <c:ptCount val="1"/>
+                <c:pt idx="0">
+                  <c:v>Series 1</c:v>
+                </c:pt>
+              </c:strCache>
+            </c:strRef>
+          </c:tx>
+          <c:spPr>
+            <a:solidFill>
+              <a:schemeClr val="accent1"/>
+            </a:solidFill>
+            <a:ln>
+              <a:noFill/>
+            </a:ln>
+            <a:effectLst/>
+          </c:spPr>
+          <c:cat>
+            <c:numRef>
+              <c:f>Sheet1!$A$2:$A$6</c:f>
+              <c:numCache>
+                <c:formatCode>m/d/yyyy</c:formatCode>
+                <c:ptCount val="5"/>
+                <c:pt idx="0">
+                  <c:v>37261</c:v>
+                </c:pt>
+                <c:pt idx="1">
+                  <c:v>37262</c:v>
+                </c:pt>
+                <c:pt idx="2">
+                  <c:v>37263</c:v>
+                </c:pt>
+                <c:pt idx="3">
+                  <c:v>37264</c:v>
+                </c:pt>
+                <c:pt idx="4">
+                  <c:v>37265</c:v>
+                </c:pt>
+              </c:numCache>
+            </c:numRef>
+          </c:cat>
+          <c:val>
+            <c:numRef>
+              <c:f>Sheet1!$B$2:$B$6</c:f>
+              <c:numCache>
+                <c:formatCode>General</c:formatCode>
+                <c:ptCount val="5"/>
+                <c:pt idx="0">
+                  <c:v>20</c:v>
+                </c:pt>
+                <c:pt idx="1">
+                  <c:v>32</c:v>
+                </c:pt>
+                <c:pt idx="2">
+                  <c:v>28</c:v>
+                </c:pt>
+                <c:pt idx="3">
+                  <c:v>40</c:v>
+                </c:pt>
+                <c:pt idx="4">
+                  <c:v>35</c:v>
+                </c:pt>
+              </c:numCache>
+            </c:numRef>
+          </c:val>
+          <c:extLst>
+            <c:ext xmlns:c16="http://schemas.microsoft.com/office/drawing/2014/chart" uri="{C3380CC4-5D6E-409C-BE32-E72D297353CC}">
+              <c16:uniqueId val="{00000000-EE41-401C-B210-FFFD08A03BC5}"/>
+            </c:ext>
+          </c:extLst>
+        </c:ser>
+        <c:dLbls>
+          <c:showLegendKey val="0"/>
+          <c:showVal val="0"/>
+          <c:showCatName val="0"/>
+          <c:showSerName val="0"/>
+          <c:showPercent val="0"/>
+          <c:showBubbleSize val="0"/>
+        </c:dLbls>
+        <c:axId val="187766479"/>
+        <c:axId val="1766662751"/>
+      </c:areaChart>
+      <c:dateAx>
+        <c:axId val="187766479"/>
+        <c:scaling>
+          <c:orientation val="minMax"/>
+        </c:scaling>
+        <c:delete val="0"/>
+        <c:axPos val="b"/>
+        <c:numFmt formatCode="m/d/yyyy" sourceLinked="1"/>
+        <c:majorTickMark val="out"/>
+        <c:minorTickMark val="none"/>
+        <c:tickLblPos val="nextTo"/>
+        <c:spPr>
+          <a:noFill/>
+          <a:ln w="9525" cap="flat" cmpd="sng" algn="ctr">
+            <a:solidFill>
+              <a:schemeClr val="tx1">
+                <a:lumMod val="15000"/>
+                <a:lumOff val="85000"/>
+              </a:schemeClr>
+            </a:solidFill>
+            <a:round/>
+          </a:ln>
+          <a:effectLst/>
+        </c:spPr>
+        <c:txPr>
+          <a:bodyPr rot="-60000000" spcFirstLastPara="1" vertOverflow="ellipsis" vert="horz" wrap="square" anchor="ctr" anchorCtr="1"/>
+          <a:lstStyle/>
+          <a:p>
+            <a:pPr>
+              <a:defRPr sz="1197" b="0" i="0" u="none" strike="noStrike" kern="1200" baseline="0">
+                <a:solidFill>
+                  <a:schemeClr val="tx1">
+                    <a:lumMod val="65000"/>
+                    <a:lumOff val="35000"/>
+                  </a:schemeClr>
+                </a:solidFill>
+                <a:latin typeface="+mn-lt"/>
+                <a:ea typeface="+mn-ea"/>
+                <a:cs typeface="+mn-cs"/>
+              </a:defRPr>
+            </a:pPr>
+            <a:endParaRPr lang="LID4096"/>
+          </a:p>
+        </c:txPr>
+        <c:crossAx val="1766662751"/>
+        <c:crosses val="autoZero"/>
+        <c:auto val="1"/>
+        <c:lblOffset val="100"/>
+        <c:baseTimeUnit val="days"/>
+      </c:dateAx>
+      <c:valAx>
+        <c:axId val="1766662751"/>
+        <c:scaling>
+          <c:orientation val="minMax"/>
+        </c:scaling>
+        <c:delete val="0"/>
+        <c:axPos val="l"/>
+        <c:majorGridlines>
+          <c:spPr>
+            <a:ln w="9525" cap="flat" cmpd="sng" algn="ctr">
+              <a:solidFill>
+                <a:schemeClr val="tx1">
+                  <a:lumMod val="15000"/>
+                  <a:lumOff val="85000"/>
+                </a:schemeClr>
+              </a:solidFill>
+              <a:round/>
+            </a:ln>
+            <a:effectLst/>
+          </c:spPr>
+        </c:majorGridlines>
+        <c:numFmt formatCode="General" sourceLinked="1"/>
+        <c:majorTickMark val="none"/>
+        <c:minorTickMark val="none"/>
+        <c:tickLblPos val="nextTo"/>
+        <c:spPr>
+          <a:noFill/>
+          <a:ln>
+            <a:noFill/>
+          </a:ln>
+          <a:effectLst/>
+        </c:spPr>
+        <c:txPr>
+          <a:bodyPr rot="-60000000" spcFirstLastPara="1" vertOverflow="ellipsis" vert="horz" wrap="square" anchor="ctr" anchorCtr="1"/>
+          <a:lstStyle/>
+          <a:p>
+            <a:pPr>
+              <a:defRPr sz="1197" b="0" i="0" u="none" strike="noStrike" kern="1200" baseline="0">
+                <a:solidFill>
+                  <a:schemeClr val="tx1">
+                    <a:lumMod val="65000"/>
+                    <a:lumOff val="35000"/>
+                  </a:schemeClr>
+                </a:solidFill>
+                <a:latin typeface="+mn-lt"/>
+                <a:ea typeface="+mn-ea"/>
+                <a:cs typeface="+mn-cs"/>
+              </a:defRPr>
+            </a:pPr>
+            <a:endParaRPr lang="LID4096"/>
+          </a:p>
+        </c:txPr>
+        <c:crossAx val="187766479"/>
+        <c:crosses val="autoZero"/>
+        <c:crossBetween val="midCat"/>
+      </c:valAx>
+      <c:spPr>
+        <a:noFill/>
+        <a:ln>
+          <a:noFill/>
+        </a:ln>
+        <a:effectLst/>
+      </c:spPr>
+    </c:plotArea>
+    <c:legend>
+      <c:legendPos val="b"/>
+      <c:overlay val="0"/>
+      <c:spPr>
+        <a:noFill/>
+        <a:ln>
+          <a:noFill/>
+        </a:ln>
+        <a:effectLst/>
+      </c:spPr>
+      <c:txPr>
+        <a:bodyPr rot="0" spcFirstLastPara="1" vertOverflow="ellipsis" vert="horz" wrap="square" anchor="ctr" anchorCtr="1"/>
+        <a:lstStyle/>
+        <a:p>
+          <a:pPr>
+            <a:defRPr sz="1197" b="0" i="0" u="none" strike="noStrike" kern="1200" baseline="0">
+              <a:solidFill>
+                <a:schemeClr val="tx1">
+                  <a:lumMod val="65000"/>
+                  <a:lumOff val="35000"/>
+                </a:schemeClr>
+              </a:solidFill>
+              <a:latin typeface="+mn-lt"/>
+              <a:ea typeface="+mn-ea"/>
+              <a:cs typeface="+mn-cs"/>
+            </a:defRPr>
+          </a:pPr>
+          <a:endParaRPr lang="LID4096"/>
+        </a:p>
+      </c:txPr>
+    </c:legend>
+    <c:plotVisOnly val="1"/>
+    <c:dispBlanksAs val="zero"/>
+    <c:extLst>
+      <c:ext xmlns:c16r3="http://schemas.microsoft.com/office/drawing/2017/03/chart" uri="{56B9EC1D-385E-4148-901F-78D8002777C0}">
+        <c16r3:dataDisplayOptions16>
+          <c16r3:dispNaAsBlank val="1"/>
+        </c16r3:dataDisplayOptions16>
+      </c:ext>
+    </c:extLst>
+    <c:showDLblsOverMax val="0"/>
+  </c:chart>
+  <c:spPr>
+    <a:noFill/>
+    <a:ln>
+      <a:noFill/>
+    </a:ln>
+    <a:effectLst/>
+  </c:spPr>
+  <c:txPr>
+    <a:bodyPr/>
+    <a:lstStyle/>
+    <a:p>
+      <a:pPr>
+        <a:defRPr/>
+      </a:pPr>
+      <a:endParaRPr lang="LID4096"/>
+    </a:p>
+  </c:txPr>
+  <c:externalData r:id="rId3">
+    <c:autoUpdate val="0"/>
+  </c:externalData>
+</c:chartSpace>
+</file>
+
 <file path=ppt/charts/colors1.xml><?xml version="1.0" encoding="utf-8"?>
+<cs:colorStyle xmlns:cs="http://schemas.microsoft.com/office/drawing/2012/chartStyle" xmlns:a="http://schemas.openxmlformats.org/drawingml/2006/main" meth="cycle" id="10">
+  <a:schemeClr val="accent1"/>
+  <a:schemeClr val="accent2"/>
+  <a:schemeClr val="accent3"/>
+  <a:schemeClr val="accent4"/>
+  <a:schemeClr val="accent5"/>
+  <a:schemeClr val="accent6"/>
+  <cs:variation/>
+  <cs:variation>
+    <a:lumMod val="60000"/>
+  </cs:variation>
+  <cs:variation>
+    <a:lumMod val="80000"/>
+    <a:lumOff val="20000"/>
+  </cs:variation>
+  <cs:variation>
+    <a:lumMod val="80000"/>
+  </cs:variation>
+  <cs:variation>
+    <a:lumMod val="60000"/>
+    <a:lumOff val="40000"/>
+  </cs:variation>
+  <cs:variation>
+    <a:lumMod val="50000"/>
+  </cs:variation>
+  <cs:variation>
+    <a:lumMod val="70000"/>
+    <a:lumOff val="30000"/>
+  </cs:variation>
+  <cs:variation>
+    <a:lumMod val="70000"/>
+  </cs:variation>
+  <cs:variation>
+    <a:lumMod val="50000"/>
+    <a:lumOff val="50000"/>
+  </cs:variation>
+</cs:colorStyle>
+</file>
+
+<file path=ppt/charts/colors2.xml><?xml version="1.0" encoding="utf-8"?>
+<cs:colorStyle xmlns:cs="http://schemas.microsoft.com/office/drawing/2012/chartStyle" xmlns:a="http://schemas.openxmlformats.org/drawingml/2006/main" meth="cycle" id="10">
+  <a:schemeClr val="accent1"/>
+  <a:schemeClr val="accent2"/>
+  <a:schemeClr val="accent3"/>
+  <a:schemeClr val="accent4"/>
+  <a:schemeClr val="accent5"/>
+  <a:schemeClr val="accent6"/>
+  <cs:variation/>
+  <cs:variation>
+    <a:lumMod val="60000"/>
+  </cs:variation>
+  <cs:variation>
+    <a:lumMod val="80000"/>
+    <a:lumOff val="20000"/>
+  </cs:variation>
+  <cs:variation>
+    <a:lumMod val="80000"/>
+  </cs:variation>
+  <cs:variation>
+    <a:lumMod val="60000"/>
+    <a:lumOff val="40000"/>
+  </cs:variation>
+  <cs:variation>
+    <a:lumMod val="50000"/>
+  </cs:variation>
+  <cs:variation>
+    <a:lumMod val="70000"/>
+    <a:lumOff val="30000"/>
+  </cs:variation>
+  <cs:variation>
+    <a:lumMod val="70000"/>
+  </cs:variation>
+  <cs:variation>
+    <a:lumMod val="50000"/>
+    <a:lumOff val="50000"/>
+  </cs:variation>
+</cs:colorStyle>
+</file>
+
+<file path=ppt/charts/colors3.xml><?xml version="1.0" encoding="utf-8"?>
 <cs:colorStyle xmlns:cs="http://schemas.microsoft.com/office/drawing/2012/chartStyle" xmlns:a="http://schemas.openxmlformats.org/drawingml/2006/main" meth="cycle" id="10">
   <a:schemeClr val="accent1"/>
   <a:schemeClr val="accent2"/>
@@ -1056,6 +2210,1030 @@
         <a:lumOff val="35000"/>
       </a:schemeClr>
     </cs:fontRef>
+    <cs:defRPr sz="1197" kern="1200"/>
+  </cs:seriesAxis>
+  <cs:seriesLine>
+    <cs:lnRef idx="0"/>
+    <cs:fillRef idx="0"/>
+    <cs:effectRef idx="0"/>
+    <cs:fontRef idx="minor">
+      <a:schemeClr val="tx1"/>
+    </cs:fontRef>
+    <cs:spPr>
+      <a:ln w="9525" cap="flat" cmpd="sng" algn="ctr">
+        <a:solidFill>
+          <a:schemeClr val="tx1">
+            <a:lumMod val="35000"/>
+            <a:lumOff val="65000"/>
+          </a:schemeClr>
+        </a:solidFill>
+        <a:round/>
+      </a:ln>
+    </cs:spPr>
+  </cs:seriesLine>
+  <cs:title>
+    <cs:lnRef idx="0"/>
+    <cs:fillRef idx="0"/>
+    <cs:effectRef idx="0"/>
+    <cs:fontRef idx="minor">
+      <a:schemeClr val="tx1">
+        <a:lumMod val="65000"/>
+        <a:lumOff val="35000"/>
+      </a:schemeClr>
+    </cs:fontRef>
+    <cs:defRPr sz="1862" b="0" kern="1200" spc="0" baseline="0"/>
+  </cs:title>
+  <cs:trendline>
+    <cs:lnRef idx="0">
+      <cs:styleClr val="auto"/>
+    </cs:lnRef>
+    <cs:fillRef idx="0"/>
+    <cs:effectRef idx="0"/>
+    <cs:fontRef idx="minor">
+      <a:schemeClr val="tx1"/>
+    </cs:fontRef>
+    <cs:spPr>
+      <a:ln w="19050" cap="rnd">
+        <a:solidFill>
+          <a:schemeClr val="phClr"/>
+        </a:solidFill>
+        <a:prstDash val="sysDot"/>
+      </a:ln>
+    </cs:spPr>
+  </cs:trendline>
+  <cs:trendlineLabel>
+    <cs:lnRef idx="0"/>
+    <cs:fillRef idx="0"/>
+    <cs:effectRef idx="0"/>
+    <cs:fontRef idx="minor">
+      <a:schemeClr val="tx1">
+        <a:lumMod val="65000"/>
+        <a:lumOff val="35000"/>
+      </a:schemeClr>
+    </cs:fontRef>
+    <cs:defRPr sz="1197" kern="1200"/>
+  </cs:trendlineLabel>
+  <cs:upBar>
+    <cs:lnRef idx="0"/>
+    <cs:fillRef idx="0"/>
+    <cs:effectRef idx="0"/>
+    <cs:fontRef idx="minor">
+      <a:schemeClr val="tx1"/>
+    </cs:fontRef>
+    <cs:spPr>
+      <a:solidFill>
+        <a:schemeClr val="lt1"/>
+      </a:solidFill>
+      <a:ln w="9525" cap="flat" cmpd="sng" algn="ctr">
+        <a:solidFill>
+          <a:schemeClr val="tx1">
+            <a:lumMod val="65000"/>
+            <a:lumOff val="35000"/>
+          </a:schemeClr>
+        </a:solidFill>
+        <a:round/>
+      </a:ln>
+    </cs:spPr>
+  </cs:upBar>
+  <cs:valueAxis>
+    <cs:lnRef idx="0"/>
+    <cs:fillRef idx="0"/>
+    <cs:effectRef idx="0"/>
+    <cs:fontRef idx="minor">
+      <a:schemeClr val="tx1">
+        <a:lumMod val="65000"/>
+        <a:lumOff val="35000"/>
+      </a:schemeClr>
+    </cs:fontRef>
+    <cs:defRPr sz="1197" kern="1200"/>
+  </cs:valueAxis>
+  <cs:wall>
+    <cs:lnRef idx="0"/>
+    <cs:fillRef idx="0"/>
+    <cs:effectRef idx="0"/>
+    <cs:fontRef idx="minor">
+      <a:schemeClr val="tx1"/>
+    </cs:fontRef>
+    <cs:spPr>
+      <a:noFill/>
+      <a:ln>
+        <a:noFill/>
+      </a:ln>
+    </cs:spPr>
+  </cs:wall>
+</cs:chartStyle>
+</file>
+
+<file path=ppt/charts/style2.xml><?xml version="1.0" encoding="utf-8"?>
+<cs:chartStyle xmlns:cs="http://schemas.microsoft.com/office/drawing/2012/chartStyle" xmlns:a="http://schemas.openxmlformats.org/drawingml/2006/main" id="201">
+  <cs:axisTitle>
+    <cs:lnRef idx="0"/>
+    <cs:fillRef idx="0"/>
+    <cs:effectRef idx="0"/>
+    <cs:fontRef idx="minor">
+      <a:schemeClr val="tx1">
+        <a:lumMod val="65000"/>
+        <a:lumOff val="35000"/>
+      </a:schemeClr>
+    </cs:fontRef>
+    <cs:defRPr sz="1330" kern="1200"/>
+  </cs:axisTitle>
+  <cs:categoryAxis>
+    <cs:lnRef idx="0"/>
+    <cs:fillRef idx="0"/>
+    <cs:effectRef idx="0"/>
+    <cs:fontRef idx="minor">
+      <a:schemeClr val="tx1">
+        <a:lumMod val="65000"/>
+        <a:lumOff val="35000"/>
+      </a:schemeClr>
+    </cs:fontRef>
+    <cs:spPr>
+      <a:ln w="9525" cap="flat" cmpd="sng" algn="ctr">
+        <a:solidFill>
+          <a:schemeClr val="tx1">
+            <a:lumMod val="15000"/>
+            <a:lumOff val="85000"/>
+          </a:schemeClr>
+        </a:solidFill>
+        <a:round/>
+      </a:ln>
+    </cs:spPr>
+    <cs:defRPr sz="1197" kern="1200"/>
+  </cs:categoryAxis>
+  <cs:chartArea mods="allowNoFillOverride allowNoLineOverride">
+    <cs:lnRef idx="0"/>
+    <cs:fillRef idx="0"/>
+    <cs:effectRef idx="0"/>
+    <cs:fontRef idx="minor">
+      <a:schemeClr val="tx1"/>
+    </cs:fontRef>
+    <cs:spPr>
+      <a:solidFill>
+        <a:schemeClr val="bg1"/>
+      </a:solidFill>
+      <a:ln w="9525" cap="flat" cmpd="sng" algn="ctr">
+        <a:solidFill>
+          <a:schemeClr val="tx1">
+            <a:lumMod val="15000"/>
+            <a:lumOff val="85000"/>
+          </a:schemeClr>
+        </a:solidFill>
+        <a:round/>
+      </a:ln>
+    </cs:spPr>
+    <cs:defRPr sz="1330" kern="1200"/>
+  </cs:chartArea>
+  <cs:dataLabel>
+    <cs:lnRef idx="0"/>
+    <cs:fillRef idx="0"/>
+    <cs:effectRef idx="0"/>
+    <cs:fontRef idx="minor">
+      <a:schemeClr val="tx1">
+        <a:lumMod val="75000"/>
+        <a:lumOff val="25000"/>
+      </a:schemeClr>
+    </cs:fontRef>
+    <cs:defRPr sz="1197" kern="1200"/>
+  </cs:dataLabel>
+  <cs:dataLabelCallout>
+    <cs:lnRef idx="0"/>
+    <cs:fillRef idx="0"/>
+    <cs:effectRef idx="0"/>
+    <cs:fontRef idx="minor">
+      <a:schemeClr val="dk1">
+        <a:lumMod val="65000"/>
+        <a:lumOff val="35000"/>
+      </a:schemeClr>
+    </cs:fontRef>
+    <cs:spPr>
+      <a:solidFill>
+        <a:schemeClr val="lt1"/>
+      </a:solidFill>
+      <a:ln>
+        <a:solidFill>
+          <a:schemeClr val="dk1">
+            <a:lumMod val="25000"/>
+            <a:lumOff val="75000"/>
+          </a:schemeClr>
+        </a:solidFill>
+      </a:ln>
+    </cs:spPr>
+    <cs:defRPr sz="1197" kern="1200"/>
+    <cs:bodyPr rot="0" spcFirstLastPara="1" vertOverflow="clip" horzOverflow="clip" vert="horz" wrap="square" lIns="36576" tIns="18288" rIns="36576" bIns="18288" anchor="ctr" anchorCtr="1">
+      <a:spAutoFit/>
+    </cs:bodyPr>
+  </cs:dataLabelCallout>
+  <cs:dataPoint>
+    <cs:lnRef idx="0"/>
+    <cs:fillRef idx="1">
+      <cs:styleClr val="auto"/>
+    </cs:fillRef>
+    <cs:effectRef idx="0"/>
+    <cs:fontRef idx="minor">
+      <a:schemeClr val="tx1"/>
+    </cs:fontRef>
+  </cs:dataPoint>
+  <cs:dataPoint3D>
+    <cs:lnRef idx="0"/>
+    <cs:fillRef idx="1">
+      <cs:styleClr val="auto"/>
+    </cs:fillRef>
+    <cs:effectRef idx="0"/>
+    <cs:fontRef idx="minor">
+      <a:schemeClr val="tx1"/>
+    </cs:fontRef>
+  </cs:dataPoint3D>
+  <cs:dataPointLine>
+    <cs:lnRef idx="0">
+      <cs:styleClr val="auto"/>
+    </cs:lnRef>
+    <cs:fillRef idx="1"/>
+    <cs:effectRef idx="0"/>
+    <cs:fontRef idx="minor">
+      <a:schemeClr val="tx1"/>
+    </cs:fontRef>
+    <cs:spPr>
+      <a:ln w="28575" cap="rnd">
+        <a:solidFill>
+          <a:schemeClr val="phClr"/>
+        </a:solidFill>
+        <a:round/>
+      </a:ln>
+    </cs:spPr>
+  </cs:dataPointLine>
+  <cs:dataPointMarker>
+    <cs:lnRef idx="0">
+      <cs:styleClr val="auto"/>
+    </cs:lnRef>
+    <cs:fillRef idx="1">
+      <cs:styleClr val="auto"/>
+    </cs:fillRef>
+    <cs:effectRef idx="0"/>
+    <cs:fontRef idx="minor">
+      <a:schemeClr val="tx1"/>
+    </cs:fontRef>
+    <cs:spPr>
+      <a:ln w="9525">
+        <a:solidFill>
+          <a:schemeClr val="phClr"/>
+        </a:solidFill>
+      </a:ln>
+    </cs:spPr>
+  </cs:dataPointMarker>
+  <cs:dataPointMarkerLayout symbol="circle" size="5"/>
+  <cs:dataPointWireframe>
+    <cs:lnRef idx="0">
+      <cs:styleClr val="auto"/>
+    </cs:lnRef>
+    <cs:fillRef idx="1"/>
+    <cs:effectRef idx="0"/>
+    <cs:fontRef idx="minor">
+      <a:schemeClr val="tx1"/>
+    </cs:fontRef>
+    <cs:spPr>
+      <a:ln w="9525" cap="rnd">
+        <a:solidFill>
+          <a:schemeClr val="phClr"/>
+        </a:solidFill>
+        <a:round/>
+      </a:ln>
+    </cs:spPr>
+  </cs:dataPointWireframe>
+  <cs:dataTable>
+    <cs:lnRef idx="0"/>
+    <cs:fillRef idx="0"/>
+    <cs:effectRef idx="0"/>
+    <cs:fontRef idx="minor">
+      <a:schemeClr val="tx1">
+        <a:lumMod val="65000"/>
+        <a:lumOff val="35000"/>
+      </a:schemeClr>
+    </cs:fontRef>
+    <cs:spPr>
+      <a:noFill/>
+      <a:ln w="9525" cap="flat" cmpd="sng" algn="ctr">
+        <a:solidFill>
+          <a:schemeClr val="tx1">
+            <a:lumMod val="15000"/>
+            <a:lumOff val="85000"/>
+          </a:schemeClr>
+        </a:solidFill>
+        <a:round/>
+      </a:ln>
+    </cs:spPr>
+    <cs:defRPr sz="1197" kern="1200"/>
+  </cs:dataTable>
+  <cs:downBar>
+    <cs:lnRef idx="0"/>
+    <cs:fillRef idx="0"/>
+    <cs:effectRef idx="0"/>
+    <cs:fontRef idx="minor">
+      <a:schemeClr val="dk1"/>
+    </cs:fontRef>
+    <cs:spPr>
+      <a:solidFill>
+        <a:schemeClr val="dk1">
+          <a:lumMod val="65000"/>
+          <a:lumOff val="35000"/>
+        </a:schemeClr>
+      </a:solidFill>
+      <a:ln w="9525">
+        <a:solidFill>
+          <a:schemeClr val="tx1">
+            <a:lumMod val="65000"/>
+            <a:lumOff val="35000"/>
+          </a:schemeClr>
+        </a:solidFill>
+      </a:ln>
+    </cs:spPr>
+  </cs:downBar>
+  <cs:dropLine>
+    <cs:lnRef idx="0"/>
+    <cs:fillRef idx="0"/>
+    <cs:effectRef idx="0"/>
+    <cs:fontRef idx="minor">
+      <a:schemeClr val="tx1"/>
+    </cs:fontRef>
+    <cs:spPr>
+      <a:ln w="9525" cap="flat" cmpd="sng" algn="ctr">
+        <a:solidFill>
+          <a:schemeClr val="tx1">
+            <a:lumMod val="35000"/>
+            <a:lumOff val="65000"/>
+          </a:schemeClr>
+        </a:solidFill>
+        <a:round/>
+      </a:ln>
+    </cs:spPr>
+  </cs:dropLine>
+  <cs:errorBar>
+    <cs:lnRef idx="0"/>
+    <cs:fillRef idx="0"/>
+    <cs:effectRef idx="0"/>
+    <cs:fontRef idx="minor">
+      <a:schemeClr val="tx1"/>
+    </cs:fontRef>
+    <cs:spPr>
+      <a:ln w="9525" cap="flat" cmpd="sng" algn="ctr">
+        <a:solidFill>
+          <a:schemeClr val="tx1">
+            <a:lumMod val="65000"/>
+            <a:lumOff val="35000"/>
+          </a:schemeClr>
+        </a:solidFill>
+        <a:round/>
+      </a:ln>
+    </cs:spPr>
+  </cs:errorBar>
+  <cs:floor>
+    <cs:lnRef idx="0"/>
+    <cs:fillRef idx="0"/>
+    <cs:effectRef idx="0"/>
+    <cs:fontRef idx="minor">
+      <a:schemeClr val="tx1"/>
+    </cs:fontRef>
+    <cs:spPr>
+      <a:noFill/>
+      <a:ln>
+        <a:noFill/>
+      </a:ln>
+    </cs:spPr>
+  </cs:floor>
+  <cs:gridlineMajor>
+    <cs:lnRef idx="0"/>
+    <cs:fillRef idx="0"/>
+    <cs:effectRef idx="0"/>
+    <cs:fontRef idx="minor">
+      <a:schemeClr val="tx1"/>
+    </cs:fontRef>
+    <cs:spPr>
+      <a:ln w="9525" cap="flat" cmpd="sng" algn="ctr">
+        <a:solidFill>
+          <a:schemeClr val="tx1">
+            <a:lumMod val="15000"/>
+            <a:lumOff val="85000"/>
+          </a:schemeClr>
+        </a:solidFill>
+        <a:round/>
+      </a:ln>
+    </cs:spPr>
+  </cs:gridlineMajor>
+  <cs:gridlineMinor>
+    <cs:lnRef idx="0"/>
+    <cs:fillRef idx="0"/>
+    <cs:effectRef idx="0"/>
+    <cs:fontRef idx="minor">
+      <a:schemeClr val="tx1"/>
+    </cs:fontRef>
+    <cs:spPr>
+      <a:ln w="9525" cap="flat" cmpd="sng" algn="ctr">
+        <a:solidFill>
+          <a:schemeClr val="tx1">
+            <a:lumMod val="5000"/>
+            <a:lumOff val="95000"/>
+          </a:schemeClr>
+        </a:solidFill>
+        <a:round/>
+      </a:ln>
+    </cs:spPr>
+  </cs:gridlineMinor>
+  <cs:hiLoLine>
+    <cs:lnRef idx="0"/>
+    <cs:fillRef idx="0"/>
+    <cs:effectRef idx="0"/>
+    <cs:fontRef idx="minor">
+      <a:schemeClr val="tx1"/>
+    </cs:fontRef>
+    <cs:spPr>
+      <a:ln w="9525" cap="flat" cmpd="sng" algn="ctr">
+        <a:solidFill>
+          <a:schemeClr val="tx1">
+            <a:lumMod val="75000"/>
+            <a:lumOff val="25000"/>
+          </a:schemeClr>
+        </a:solidFill>
+        <a:round/>
+      </a:ln>
+    </cs:spPr>
+  </cs:hiLoLine>
+  <cs:leaderLine>
+    <cs:lnRef idx="0"/>
+    <cs:fillRef idx="0"/>
+    <cs:effectRef idx="0"/>
+    <cs:fontRef idx="minor">
+      <a:schemeClr val="tx1"/>
+    </cs:fontRef>
+    <cs:spPr>
+      <a:ln w="9525" cap="flat" cmpd="sng" algn="ctr">
+        <a:solidFill>
+          <a:schemeClr val="tx1">
+            <a:lumMod val="35000"/>
+            <a:lumOff val="65000"/>
+          </a:schemeClr>
+        </a:solidFill>
+        <a:round/>
+      </a:ln>
+    </cs:spPr>
+  </cs:leaderLine>
+  <cs:legend>
+    <cs:lnRef idx="0"/>
+    <cs:fillRef idx="0"/>
+    <cs:effectRef idx="0"/>
+    <cs:fontRef idx="minor">
+      <a:schemeClr val="tx1">
+        <a:lumMod val="65000"/>
+        <a:lumOff val="35000"/>
+      </a:schemeClr>
+    </cs:fontRef>
+    <cs:defRPr sz="1197" kern="1200"/>
+  </cs:legend>
+  <cs:plotArea mods="allowNoFillOverride allowNoLineOverride">
+    <cs:lnRef idx="0"/>
+    <cs:fillRef idx="0"/>
+    <cs:effectRef idx="0"/>
+    <cs:fontRef idx="minor">
+      <a:schemeClr val="tx1"/>
+    </cs:fontRef>
+  </cs:plotArea>
+  <cs:plotArea3D mods="allowNoFillOverride allowNoLineOverride">
+    <cs:lnRef idx="0"/>
+    <cs:fillRef idx="0"/>
+    <cs:effectRef idx="0"/>
+    <cs:fontRef idx="minor">
+      <a:schemeClr val="tx1"/>
+    </cs:fontRef>
+  </cs:plotArea3D>
+  <cs:seriesAxis>
+    <cs:lnRef idx="0"/>
+    <cs:fillRef idx="0"/>
+    <cs:effectRef idx="0"/>
+    <cs:fontRef idx="minor">
+      <a:schemeClr val="tx1">
+        <a:lumMod val="65000"/>
+        <a:lumOff val="35000"/>
+      </a:schemeClr>
+    </cs:fontRef>
+    <cs:defRPr sz="1197" kern="1200"/>
+  </cs:seriesAxis>
+  <cs:seriesLine>
+    <cs:lnRef idx="0"/>
+    <cs:fillRef idx="0"/>
+    <cs:effectRef idx="0"/>
+    <cs:fontRef idx="minor">
+      <a:schemeClr val="tx1"/>
+    </cs:fontRef>
+    <cs:spPr>
+      <a:ln w="9525" cap="flat" cmpd="sng" algn="ctr">
+        <a:solidFill>
+          <a:schemeClr val="tx1">
+            <a:lumMod val="35000"/>
+            <a:lumOff val="65000"/>
+          </a:schemeClr>
+        </a:solidFill>
+        <a:round/>
+      </a:ln>
+    </cs:spPr>
+  </cs:seriesLine>
+  <cs:title>
+    <cs:lnRef idx="0"/>
+    <cs:fillRef idx="0"/>
+    <cs:effectRef idx="0"/>
+    <cs:fontRef idx="minor">
+      <a:schemeClr val="tx1">
+        <a:lumMod val="65000"/>
+        <a:lumOff val="35000"/>
+      </a:schemeClr>
+    </cs:fontRef>
+    <cs:defRPr sz="1862" b="0" kern="1200" spc="0" baseline="0"/>
+  </cs:title>
+  <cs:trendline>
+    <cs:lnRef idx="0">
+      <cs:styleClr val="auto"/>
+    </cs:lnRef>
+    <cs:fillRef idx="0"/>
+    <cs:effectRef idx="0"/>
+    <cs:fontRef idx="minor">
+      <a:schemeClr val="tx1"/>
+    </cs:fontRef>
+    <cs:spPr>
+      <a:ln w="19050" cap="rnd">
+        <a:solidFill>
+          <a:schemeClr val="phClr"/>
+        </a:solidFill>
+        <a:prstDash val="sysDot"/>
+      </a:ln>
+    </cs:spPr>
+  </cs:trendline>
+  <cs:trendlineLabel>
+    <cs:lnRef idx="0"/>
+    <cs:fillRef idx="0"/>
+    <cs:effectRef idx="0"/>
+    <cs:fontRef idx="minor">
+      <a:schemeClr val="tx1">
+        <a:lumMod val="65000"/>
+        <a:lumOff val="35000"/>
+      </a:schemeClr>
+    </cs:fontRef>
+    <cs:defRPr sz="1197" kern="1200"/>
+  </cs:trendlineLabel>
+  <cs:upBar>
+    <cs:lnRef idx="0"/>
+    <cs:fillRef idx="0"/>
+    <cs:effectRef idx="0"/>
+    <cs:fontRef idx="minor">
+      <a:schemeClr val="dk1"/>
+    </cs:fontRef>
+    <cs:spPr>
+      <a:solidFill>
+        <a:schemeClr val="lt1"/>
+      </a:solidFill>
+      <a:ln w="9525">
+        <a:solidFill>
+          <a:schemeClr val="tx1">
+            <a:lumMod val="15000"/>
+            <a:lumOff val="85000"/>
+          </a:schemeClr>
+        </a:solidFill>
+      </a:ln>
+    </cs:spPr>
+  </cs:upBar>
+  <cs:valueAxis>
+    <cs:lnRef idx="0"/>
+    <cs:fillRef idx="0"/>
+    <cs:effectRef idx="0"/>
+    <cs:fontRef idx="minor">
+      <a:schemeClr val="tx1">
+        <a:lumMod val="65000"/>
+        <a:lumOff val="35000"/>
+      </a:schemeClr>
+    </cs:fontRef>
+    <cs:defRPr sz="1197" kern="1200"/>
+  </cs:valueAxis>
+  <cs:wall>
+    <cs:lnRef idx="0"/>
+    <cs:fillRef idx="0"/>
+    <cs:effectRef idx="0"/>
+    <cs:fontRef idx="minor">
+      <a:schemeClr val="tx1"/>
+    </cs:fontRef>
+    <cs:spPr>
+      <a:noFill/>
+      <a:ln>
+        <a:noFill/>
+      </a:ln>
+    </cs:spPr>
+  </cs:wall>
+</cs:chartStyle>
+</file>
+
+<file path=ppt/charts/style3.xml><?xml version="1.0" encoding="utf-8"?>
+<cs:chartStyle xmlns:cs="http://schemas.microsoft.com/office/drawing/2012/chartStyle" xmlns:a="http://schemas.openxmlformats.org/drawingml/2006/main" id="276">
+  <cs:axisTitle>
+    <cs:lnRef idx="0"/>
+    <cs:fillRef idx="0"/>
+    <cs:effectRef idx="0"/>
+    <cs:fontRef idx="minor">
+      <a:schemeClr val="tx1">
+        <a:lumMod val="65000"/>
+        <a:lumOff val="35000"/>
+      </a:schemeClr>
+    </cs:fontRef>
+    <cs:defRPr sz="1330" kern="1200"/>
+  </cs:axisTitle>
+  <cs:categoryAxis>
+    <cs:lnRef idx="0"/>
+    <cs:fillRef idx="0"/>
+    <cs:effectRef idx="0"/>
+    <cs:fontRef idx="minor">
+      <a:schemeClr val="tx1">
+        <a:lumMod val="65000"/>
+        <a:lumOff val="35000"/>
+      </a:schemeClr>
+    </cs:fontRef>
+    <cs:spPr>
+      <a:ln w="9525" cap="flat" cmpd="sng" algn="ctr">
+        <a:solidFill>
+          <a:schemeClr val="tx1">
+            <a:lumMod val="15000"/>
+            <a:lumOff val="85000"/>
+          </a:schemeClr>
+        </a:solidFill>
+        <a:round/>
+      </a:ln>
+    </cs:spPr>
+    <cs:defRPr sz="1197" kern="1200"/>
+  </cs:categoryAxis>
+  <cs:chartArea mods="allowNoFillOverride allowNoLineOverride">
+    <cs:lnRef idx="0"/>
+    <cs:fillRef idx="0"/>
+    <cs:effectRef idx="0"/>
+    <cs:fontRef idx="minor">
+      <a:schemeClr val="tx1"/>
+    </cs:fontRef>
+    <cs:spPr>
+      <a:solidFill>
+        <a:schemeClr val="bg1"/>
+      </a:solidFill>
+      <a:ln w="9525" cap="flat" cmpd="sng" algn="ctr">
+        <a:solidFill>
+          <a:schemeClr val="tx1">
+            <a:lumMod val="15000"/>
+            <a:lumOff val="85000"/>
+          </a:schemeClr>
+        </a:solidFill>
+        <a:round/>
+      </a:ln>
+    </cs:spPr>
+    <cs:defRPr sz="1330" kern="1200"/>
+  </cs:chartArea>
+  <cs:dataLabel>
+    <cs:lnRef idx="0"/>
+    <cs:fillRef idx="0"/>
+    <cs:effectRef idx="0"/>
+    <cs:fontRef idx="minor">
+      <a:schemeClr val="tx1">
+        <a:lumMod val="75000"/>
+        <a:lumOff val="25000"/>
+      </a:schemeClr>
+    </cs:fontRef>
+    <cs:defRPr sz="1197" kern="1200"/>
+  </cs:dataLabel>
+  <cs:dataLabelCallout>
+    <cs:lnRef idx="0"/>
+    <cs:fillRef idx="0"/>
+    <cs:effectRef idx="0"/>
+    <cs:fontRef idx="minor">
+      <a:schemeClr val="dk1">
+        <a:lumMod val="65000"/>
+        <a:lumOff val="35000"/>
+      </a:schemeClr>
+    </cs:fontRef>
+    <cs:spPr>
+      <a:solidFill>
+        <a:schemeClr val="lt1"/>
+      </a:solidFill>
+      <a:ln>
+        <a:solidFill>
+          <a:schemeClr val="dk1">
+            <a:lumMod val="25000"/>
+            <a:lumOff val="75000"/>
+          </a:schemeClr>
+        </a:solidFill>
+      </a:ln>
+    </cs:spPr>
+    <cs:defRPr sz="1197" kern="1200"/>
+    <cs:bodyPr rot="0" spcFirstLastPara="1" vertOverflow="clip" horzOverflow="clip" vert="horz" wrap="square" lIns="36576" tIns="18288" rIns="36576" bIns="18288" anchor="ctr" anchorCtr="1">
+      <a:spAutoFit/>
+    </cs:bodyPr>
+  </cs:dataLabelCallout>
+  <cs:dataPoint>
+    <cs:lnRef idx="0"/>
+    <cs:fillRef idx="1">
+      <cs:styleClr val="auto"/>
+    </cs:fillRef>
+    <cs:effectRef idx="0"/>
+    <cs:fontRef idx="minor">
+      <a:schemeClr val="tx1"/>
+    </cs:fontRef>
+  </cs:dataPoint>
+  <cs:dataPoint3D>
+    <cs:lnRef idx="0"/>
+    <cs:fillRef idx="1">
+      <cs:styleClr val="auto"/>
+    </cs:fillRef>
+    <cs:effectRef idx="0"/>
+    <cs:fontRef idx="minor">
+      <a:schemeClr val="tx1"/>
+    </cs:fontRef>
+  </cs:dataPoint3D>
+  <cs:dataPointLine>
+    <cs:lnRef idx="0">
+      <cs:styleClr val="auto"/>
+    </cs:lnRef>
+    <cs:fillRef idx="1"/>
+    <cs:effectRef idx="0"/>
+    <cs:fontRef idx="minor">
+      <a:schemeClr val="tx1"/>
+    </cs:fontRef>
+    <cs:spPr>
+      <a:ln w="28575" cap="rnd">
+        <a:solidFill>
+          <a:schemeClr val="phClr"/>
+        </a:solidFill>
+        <a:round/>
+      </a:ln>
+    </cs:spPr>
+  </cs:dataPointLine>
+  <cs:dataPointMarker>
+    <cs:lnRef idx="0">
+      <cs:styleClr val="auto"/>
+    </cs:lnRef>
+    <cs:fillRef idx="1">
+      <cs:styleClr val="auto"/>
+    </cs:fillRef>
+    <cs:effectRef idx="0"/>
+    <cs:fontRef idx="minor">
+      <a:schemeClr val="tx1"/>
+    </cs:fontRef>
+    <cs:spPr>
+      <a:ln w="9525">
+        <a:solidFill>
+          <a:schemeClr val="phClr"/>
+        </a:solidFill>
+      </a:ln>
+    </cs:spPr>
+  </cs:dataPointMarker>
+  <cs:dataPointMarkerLayout symbol="circle" size="5"/>
+  <cs:dataPointWireframe>
+    <cs:lnRef idx="0">
+      <cs:styleClr val="auto"/>
+    </cs:lnRef>
+    <cs:fillRef idx="1"/>
+    <cs:effectRef idx="0"/>
+    <cs:fontRef idx="minor">
+      <a:schemeClr val="tx1"/>
+    </cs:fontRef>
+    <cs:spPr>
+      <a:ln w="9525" cap="rnd">
+        <a:solidFill>
+          <a:schemeClr val="phClr"/>
+        </a:solidFill>
+        <a:round/>
+      </a:ln>
+    </cs:spPr>
+  </cs:dataPointWireframe>
+  <cs:dataTable>
+    <cs:lnRef idx="0"/>
+    <cs:fillRef idx="0"/>
+    <cs:effectRef idx="0"/>
+    <cs:fontRef idx="minor">
+      <a:schemeClr val="tx1">
+        <a:lumMod val="65000"/>
+        <a:lumOff val="35000"/>
+      </a:schemeClr>
+    </cs:fontRef>
+    <cs:spPr>
+      <a:noFill/>
+      <a:ln w="9525" cap="flat" cmpd="sng" algn="ctr">
+        <a:solidFill>
+          <a:schemeClr val="tx1">
+            <a:lumMod val="15000"/>
+            <a:lumOff val="85000"/>
+          </a:schemeClr>
+        </a:solidFill>
+        <a:round/>
+      </a:ln>
+    </cs:spPr>
+    <cs:defRPr sz="1197" kern="1200"/>
+  </cs:dataTable>
+  <cs:downBar>
+    <cs:lnRef idx="0"/>
+    <cs:fillRef idx="0"/>
+    <cs:effectRef idx="0"/>
+    <cs:fontRef idx="minor">
+      <a:schemeClr val="tx1"/>
+    </cs:fontRef>
+    <cs:spPr>
+      <a:solidFill>
+        <a:schemeClr val="dk1">
+          <a:lumMod val="75000"/>
+          <a:lumOff val="25000"/>
+        </a:schemeClr>
+      </a:solidFill>
+      <a:ln w="9525" cap="flat" cmpd="sng" algn="ctr">
+        <a:solidFill>
+          <a:schemeClr val="tx1">
+            <a:lumMod val="65000"/>
+            <a:lumOff val="35000"/>
+          </a:schemeClr>
+        </a:solidFill>
+        <a:round/>
+      </a:ln>
+    </cs:spPr>
+  </cs:downBar>
+  <cs:dropLine>
+    <cs:lnRef idx="0"/>
+    <cs:fillRef idx="0"/>
+    <cs:effectRef idx="0"/>
+    <cs:fontRef idx="minor">
+      <a:schemeClr val="tx1"/>
+    </cs:fontRef>
+    <cs:spPr>
+      <a:ln w="9525" cap="flat" cmpd="sng" algn="ctr">
+        <a:solidFill>
+          <a:schemeClr val="tx1">
+            <a:lumMod val="35000"/>
+            <a:lumOff val="65000"/>
+          </a:schemeClr>
+        </a:solidFill>
+        <a:round/>
+      </a:ln>
+    </cs:spPr>
+  </cs:dropLine>
+  <cs:errorBar>
+    <cs:lnRef idx="0"/>
+    <cs:fillRef idx="0"/>
+    <cs:effectRef idx="0"/>
+    <cs:fontRef idx="minor">
+      <a:schemeClr val="tx1"/>
+    </cs:fontRef>
+    <cs:spPr>
+      <a:ln w="9525" cap="flat" cmpd="sng" algn="ctr">
+        <a:solidFill>
+          <a:schemeClr val="tx1">
+            <a:lumMod val="65000"/>
+            <a:lumOff val="35000"/>
+          </a:schemeClr>
+        </a:solidFill>
+        <a:round/>
+      </a:ln>
+    </cs:spPr>
+  </cs:errorBar>
+  <cs:floor>
+    <cs:lnRef idx="0"/>
+    <cs:fillRef idx="0"/>
+    <cs:effectRef idx="0"/>
+    <cs:fontRef idx="minor">
+      <a:schemeClr val="tx1"/>
+    </cs:fontRef>
+    <cs:spPr>
+      <a:ln w="9525" cap="flat" cmpd="sng" algn="ctr">
+        <a:solidFill>
+          <a:schemeClr val="tx1">
+            <a:lumMod val="15000"/>
+            <a:lumOff val="85000"/>
+          </a:schemeClr>
+        </a:solidFill>
+        <a:round/>
+      </a:ln>
+    </cs:spPr>
+  </cs:floor>
+  <cs:gridlineMajor>
+    <cs:lnRef idx="0"/>
+    <cs:fillRef idx="0"/>
+    <cs:effectRef idx="0"/>
+    <cs:fontRef idx="minor">
+      <a:schemeClr val="tx1"/>
+    </cs:fontRef>
+    <cs:spPr>
+      <a:ln w="9525" cap="flat" cmpd="sng" algn="ctr">
+        <a:solidFill>
+          <a:schemeClr val="tx1">
+            <a:lumMod val="15000"/>
+            <a:lumOff val="85000"/>
+          </a:schemeClr>
+        </a:solidFill>
+        <a:round/>
+      </a:ln>
+    </cs:spPr>
+  </cs:gridlineMajor>
+  <cs:gridlineMinor>
+    <cs:lnRef idx="0"/>
+    <cs:fillRef idx="0"/>
+    <cs:effectRef idx="0"/>
+    <cs:fontRef idx="minor">
+      <a:schemeClr val="tx1"/>
+    </cs:fontRef>
+    <cs:spPr>
+      <a:ln w="9525" cap="flat" cmpd="sng" algn="ctr">
+        <a:solidFill>
+          <a:schemeClr val="tx1">
+            <a:lumMod val="5000"/>
+            <a:lumOff val="95000"/>
+          </a:schemeClr>
+        </a:solidFill>
+        <a:round/>
+      </a:ln>
+    </cs:spPr>
+  </cs:gridlineMinor>
+  <cs:hiLoLine>
+    <cs:lnRef idx="0"/>
+    <cs:fillRef idx="0"/>
+    <cs:effectRef idx="0"/>
+    <cs:fontRef idx="minor">
+      <a:schemeClr val="tx1"/>
+    </cs:fontRef>
+    <cs:spPr>
+      <a:ln w="9525" cap="flat" cmpd="sng" algn="ctr">
+        <a:solidFill>
+          <a:schemeClr val="tx1">
+            <a:lumMod val="50000"/>
+            <a:lumOff val="50000"/>
+          </a:schemeClr>
+        </a:solidFill>
+        <a:round/>
+      </a:ln>
+    </cs:spPr>
+  </cs:hiLoLine>
+  <cs:leaderLine>
+    <cs:lnRef idx="0"/>
+    <cs:fillRef idx="0"/>
+    <cs:effectRef idx="0"/>
+    <cs:fontRef idx="minor">
+      <a:schemeClr val="tx1"/>
+    </cs:fontRef>
+    <cs:spPr>
+      <a:ln w="9525" cap="flat" cmpd="sng" algn="ctr">
+        <a:solidFill>
+          <a:schemeClr val="tx1">
+            <a:lumMod val="35000"/>
+            <a:lumOff val="65000"/>
+          </a:schemeClr>
+        </a:solidFill>
+        <a:round/>
+      </a:ln>
+    </cs:spPr>
+  </cs:leaderLine>
+  <cs:legend>
+    <cs:lnRef idx="0"/>
+    <cs:fillRef idx="0"/>
+    <cs:effectRef idx="0"/>
+    <cs:fontRef idx="minor">
+      <a:schemeClr val="tx1">
+        <a:lumMod val="65000"/>
+        <a:lumOff val="35000"/>
+      </a:schemeClr>
+    </cs:fontRef>
+    <cs:defRPr sz="1197" kern="1200"/>
+  </cs:legend>
+  <cs:plotArea mods="allowNoFillOverride allowNoLineOverride">
+    <cs:lnRef idx="0"/>
+    <cs:fillRef idx="0"/>
+    <cs:effectRef idx="0"/>
+    <cs:fontRef idx="minor">
+      <a:schemeClr val="tx1"/>
+    </cs:fontRef>
+  </cs:plotArea>
+  <cs:plotArea3D mods="allowNoFillOverride allowNoLineOverride">
+    <cs:lnRef idx="0"/>
+    <cs:fillRef idx="0"/>
+    <cs:effectRef idx="0"/>
+    <cs:fontRef idx="minor">
+      <a:schemeClr val="tx1"/>
+    </cs:fontRef>
+  </cs:plotArea3D>
+  <cs:seriesAxis>
+    <cs:lnRef idx="0"/>
+    <cs:fillRef idx="0"/>
+    <cs:effectRef idx="0"/>
+    <cs:fontRef idx="minor">
+      <a:schemeClr val="tx1">
+        <a:lumMod val="65000"/>
+        <a:lumOff val="35000"/>
+      </a:schemeClr>
+    </cs:fontRef>
+    <cs:spPr>
+      <a:ln w="9525" cap="flat" cmpd="sng" algn="ctr">
+        <a:solidFill>
+          <a:schemeClr val="tx1">
+            <a:lumMod val="15000"/>
+            <a:lumOff val="85000"/>
+          </a:schemeClr>
+        </a:solidFill>
+        <a:round/>
+      </a:ln>
+    </cs:spPr>
     <cs:defRPr sz="1197" kern="1200"/>
   </cs:seriesAxis>
   <cs:seriesLine>
@@ -1319,7 +3497,7 @@
           <a:p>
             <a:fld id="{0E9C1207-8C0F-4467-9EE0-B66820579898}" type="datetimeFigureOut">
               <a:rPr lang="LID4096" smtClean="0"/>
-              <a:t>09/10/2023</a:t>
+              <a:t>09/13/2023</a:t>
             </a:fld>
             <a:endParaRPr lang="LID4096"/>
           </a:p>
@@ -1519,7 +3697,7 @@
           <a:p>
             <a:fld id="{0E9C1207-8C0F-4467-9EE0-B66820579898}" type="datetimeFigureOut">
               <a:rPr lang="LID4096" smtClean="0"/>
-              <a:t>09/10/2023</a:t>
+              <a:t>09/13/2023</a:t>
             </a:fld>
             <a:endParaRPr lang="LID4096"/>
           </a:p>
@@ -1729,7 +3907,7 @@
           <a:p>
             <a:fld id="{0E9C1207-8C0F-4467-9EE0-B66820579898}" type="datetimeFigureOut">
               <a:rPr lang="LID4096" smtClean="0"/>
-              <a:t>09/10/2023</a:t>
+              <a:t>09/13/2023</a:t>
             </a:fld>
             <a:endParaRPr lang="LID4096"/>
           </a:p>
@@ -1929,7 +4107,7 @@
           <a:p>
             <a:fld id="{0E9C1207-8C0F-4467-9EE0-B66820579898}" type="datetimeFigureOut">
               <a:rPr lang="LID4096" smtClean="0"/>
-              <a:t>09/10/2023</a:t>
+              <a:t>09/13/2023</a:t>
             </a:fld>
             <a:endParaRPr lang="LID4096"/>
           </a:p>
@@ -2205,7 +4383,7 @@
           <a:p>
             <a:fld id="{0E9C1207-8C0F-4467-9EE0-B66820579898}" type="datetimeFigureOut">
               <a:rPr lang="LID4096" smtClean="0"/>
-              <a:t>09/10/2023</a:t>
+              <a:t>09/13/2023</a:t>
             </a:fld>
             <a:endParaRPr lang="LID4096"/>
           </a:p>
@@ -2473,7 +4651,7 @@
           <a:p>
             <a:fld id="{0E9C1207-8C0F-4467-9EE0-B66820579898}" type="datetimeFigureOut">
               <a:rPr lang="LID4096" smtClean="0"/>
-              <a:t>09/10/2023</a:t>
+              <a:t>09/13/2023</a:t>
             </a:fld>
             <a:endParaRPr lang="LID4096"/>
           </a:p>
@@ -2888,7 +5066,7 @@
           <a:p>
             <a:fld id="{0E9C1207-8C0F-4467-9EE0-B66820579898}" type="datetimeFigureOut">
               <a:rPr lang="LID4096" smtClean="0"/>
-              <a:t>09/10/2023</a:t>
+              <a:t>09/13/2023</a:t>
             </a:fld>
             <a:endParaRPr lang="LID4096"/>
           </a:p>
@@ -3030,7 +5208,7 @@
           <a:p>
             <a:fld id="{0E9C1207-8C0F-4467-9EE0-B66820579898}" type="datetimeFigureOut">
               <a:rPr lang="LID4096" smtClean="0"/>
-              <a:t>09/10/2023</a:t>
+              <a:t>09/13/2023</a:t>
             </a:fld>
             <a:endParaRPr lang="LID4096"/>
           </a:p>
@@ -3143,7 +5321,7 @@
           <a:p>
             <a:fld id="{0E9C1207-8C0F-4467-9EE0-B66820579898}" type="datetimeFigureOut">
               <a:rPr lang="LID4096" smtClean="0"/>
-              <a:t>09/10/2023</a:t>
+              <a:t>09/13/2023</a:t>
             </a:fld>
             <a:endParaRPr lang="LID4096"/>
           </a:p>
@@ -3456,7 +5634,7 @@
           <a:p>
             <a:fld id="{0E9C1207-8C0F-4467-9EE0-B66820579898}" type="datetimeFigureOut">
               <a:rPr lang="LID4096" smtClean="0"/>
-              <a:t>09/10/2023</a:t>
+              <a:t>09/13/2023</a:t>
             </a:fld>
             <a:endParaRPr lang="LID4096"/>
           </a:p>
@@ -3745,7 +5923,7 @@
           <a:p>
             <a:fld id="{0E9C1207-8C0F-4467-9EE0-B66820579898}" type="datetimeFigureOut">
               <a:rPr lang="LID4096" smtClean="0"/>
-              <a:t>09/10/2023</a:t>
+              <a:t>09/13/2023</a:t>
             </a:fld>
             <a:endParaRPr lang="LID4096"/>
           </a:p>
@@ -3988,7 +6166,7 @@
           <a:p>
             <a:fld id="{0E9C1207-8C0F-4467-9EE0-B66820579898}" type="datetimeFigureOut">
               <a:rPr lang="LID4096" smtClean="0"/>
-              <a:t>09/10/2023</a:t>
+              <a:t>09/13/2023</a:t>
             </a:fld>
             <a:endParaRPr lang="LID4096"/>
           </a:p>
@@ -5040,10 +7218,10 @@
       </p:pic>
       <p:sp>
         <p:nvSpPr>
-          <p:cNvPr id="6" name="TextBox 5">
-            <a:extLst>
-              <a:ext uri="{FF2B5EF4-FFF2-40B4-BE49-F238E27FC236}">
-                <a16:creationId xmlns:a16="http://schemas.microsoft.com/office/drawing/2014/main" id="{AE54FD78-00E9-1873-20B5-E55BD58D0CBB}"/>
+          <p:cNvPr id="3" name="TextBox 2">
+            <a:extLst>
+              <a:ext uri="{FF2B5EF4-FFF2-40B4-BE49-F238E27FC236}">
+                <a16:creationId xmlns:a16="http://schemas.microsoft.com/office/drawing/2014/main" id="{2B2DD87D-C487-1002-8B50-58FBD9A5A212}"/>
               </a:ext>
             </a:extLst>
           </p:cNvPr>
@@ -5052,44 +7230,7 @@
         </p:nvSpPr>
         <p:spPr>
           <a:xfrm>
-            <a:off x="104386" y="5877101"/>
-            <a:ext cx="2705878" cy="369332"/>
-          </a:xfrm>
-          <a:prstGeom prst="rect">
-            <a:avLst/>
-          </a:prstGeom>
-          <a:noFill/>
-        </p:spPr>
-        <p:txBody>
-          <a:bodyPr wrap="square" rtlCol="0">
-            <a:spAutoFit/>
-          </a:bodyPr>
-          <a:lstStyle/>
-          <a:p>
-            <a:pPr algn="ctr"/>
-            <a:r>
-              <a:rPr lang="en-US" dirty="0"/>
-              <a:t>*BG Image</a:t>
-            </a:r>
-            <a:endParaRPr lang="LID4096" dirty="0"/>
-          </a:p>
-        </p:txBody>
-      </p:sp>
-      <p:sp>
-        <p:nvSpPr>
-          <p:cNvPr id="3" name="TextBox 2">
-            <a:extLst>
-              <a:ext uri="{FF2B5EF4-FFF2-40B4-BE49-F238E27FC236}">
-                <a16:creationId xmlns:a16="http://schemas.microsoft.com/office/drawing/2014/main" id="{2B2DD87D-C487-1002-8B50-58FBD9A5A212}"/>
-              </a:ext>
-            </a:extLst>
-          </p:cNvPr>
-          <p:cNvSpPr txBox="1"/>
-          <p:nvPr/>
-        </p:nvSpPr>
-        <p:spPr>
-          <a:xfrm>
-            <a:off x="3719610" y="807099"/>
+            <a:off x="4024704" y="138092"/>
             <a:ext cx="3985337" cy="369332"/>
           </a:xfrm>
           <a:prstGeom prst="rect">
@@ -5106,7 +7247,7 @@
             <a:pPr algn="ctr"/>
             <a:r>
               <a:rPr lang="en-US" dirty="0"/>
-              <a:t>Dashboard</a:t>
+              <a:t>Dashboard (with grid illustration)</a:t>
             </a:r>
           </a:p>
         </p:txBody>
@@ -5191,7 +7332,7 @@
         </p:nvSpPr>
         <p:spPr>
           <a:xfrm>
-            <a:off x="3719610" y="4530015"/>
+            <a:off x="102832" y="4530015"/>
             <a:ext cx="3985337" cy="369332"/>
           </a:xfrm>
           <a:prstGeom prst="rect">
@@ -5227,8 +7368,8 @@
         </p:nvSpPr>
         <p:spPr>
           <a:xfrm>
-            <a:off x="3126921" y="5223979"/>
-            <a:ext cx="1794004" cy="646331"/>
+            <a:off x="6071572" y="5243793"/>
+            <a:ext cx="1794004" cy="369332"/>
           </a:xfrm>
           <a:prstGeom prst="rect">
             <a:avLst/>
@@ -5248,17 +7389,6 @@
                   <a:srgbClr val="FF0000"/>
                 </a:solidFill>
               </a:rPr>
-              <a:t>150$</a:t>
-            </a:r>
-          </a:p>
-          <a:p>
-            <a:pPr algn="ctr"/>
-            <a:r>
-              <a:rPr lang="en-US" dirty="0">
-                <a:solidFill>
-                  <a:srgbClr val="FF0000"/>
-                </a:solidFill>
-              </a:rPr>
               <a:t>Add Expense</a:t>
             </a:r>
           </a:p>
@@ -5278,8 +7408,8 @@
         </p:nvSpPr>
         <p:spPr>
           <a:xfrm>
-            <a:off x="6529193" y="5223979"/>
-            <a:ext cx="1794004" cy="646331"/>
+            <a:off x="4259361" y="5238361"/>
+            <a:ext cx="1794004" cy="369332"/>
           </a:xfrm>
           <a:prstGeom prst="rect">
             <a:avLst/>
@@ -5299,17 +7429,6 @@
                   <a:schemeClr val="accent6"/>
                 </a:solidFill>
               </a:rPr>
-              <a:t>1500$</a:t>
-            </a:r>
-          </a:p>
-          <a:p>
-            <a:pPr algn="ctr"/>
-            <a:r>
-              <a:rPr lang="en-US" dirty="0">
-                <a:solidFill>
-                  <a:schemeClr val="accent6"/>
-                </a:solidFill>
-              </a:rPr>
               <a:t>Add Income</a:t>
             </a:r>
           </a:p>
@@ -5328,13 +7447,13 @@
           <p:nvPr>
             <p:extLst>
               <p:ext uri="{D42A27DB-BD31-4B8C-83A1-F6EECF244321}">
-                <p14:modId xmlns:p14="http://schemas.microsoft.com/office/powerpoint/2010/main" val="3181717009"/>
+                <p14:modId xmlns:p14="http://schemas.microsoft.com/office/powerpoint/2010/main" val="2336271701"/>
               </p:ext>
             </p:extLst>
           </p:nvPr>
         </p:nvGraphicFramePr>
         <p:xfrm>
-          <a:off x="3368674" y="1242894"/>
+          <a:off x="-248104" y="1242894"/>
           <a:ext cx="4687207" cy="3124805"/>
         </p:xfrm>
         <a:graphic>
@@ -5343,6 +7462,387 @@
           </a:graphicData>
         </a:graphic>
       </p:graphicFrame>
+      <p:cxnSp>
+        <p:nvCxnSpPr>
+          <p:cNvPr id="4" name="Straight Connector 3">
+            <a:extLst>
+              <a:ext uri="{FF2B5EF4-FFF2-40B4-BE49-F238E27FC236}">
+                <a16:creationId xmlns:a16="http://schemas.microsoft.com/office/drawing/2014/main" id="{64DF816F-3964-81EF-3956-2B4FBC13C484}"/>
+              </a:ext>
+            </a:extLst>
+          </p:cNvPr>
+          <p:cNvCxnSpPr>
+            <a:cxnSpLocks/>
+          </p:cNvCxnSpPr>
+          <p:nvPr/>
+        </p:nvCxnSpPr>
+        <p:spPr>
+          <a:xfrm>
+            <a:off x="4267784" y="715828"/>
+            <a:ext cx="0" cy="5456372"/>
+          </a:xfrm>
+          <a:prstGeom prst="line">
+            <a:avLst/>
+          </a:prstGeom>
+        </p:spPr>
+        <p:style>
+          <a:lnRef idx="1">
+            <a:schemeClr val="accent1"/>
+          </a:lnRef>
+          <a:fillRef idx="0">
+            <a:schemeClr val="accent1"/>
+          </a:fillRef>
+          <a:effectRef idx="0">
+            <a:schemeClr val="accent1"/>
+          </a:effectRef>
+          <a:fontRef idx="minor">
+            <a:schemeClr val="tx1"/>
+          </a:fontRef>
+        </p:style>
+      </p:cxnSp>
+      <p:cxnSp>
+        <p:nvCxnSpPr>
+          <p:cNvPr id="8" name="Straight Connector 7">
+            <a:extLst>
+              <a:ext uri="{FF2B5EF4-FFF2-40B4-BE49-F238E27FC236}">
+                <a16:creationId xmlns:a16="http://schemas.microsoft.com/office/drawing/2014/main" id="{F198A5AA-F831-8822-16D4-CD843781E787}"/>
+              </a:ext>
+            </a:extLst>
+          </p:cNvPr>
+          <p:cNvCxnSpPr>
+            <a:cxnSpLocks/>
+          </p:cNvCxnSpPr>
+          <p:nvPr/>
+        </p:nvCxnSpPr>
+        <p:spPr>
+          <a:xfrm>
+            <a:off x="7909055" y="715828"/>
+            <a:ext cx="0" cy="5456372"/>
+          </a:xfrm>
+          <a:prstGeom prst="line">
+            <a:avLst/>
+          </a:prstGeom>
+        </p:spPr>
+        <p:style>
+          <a:lnRef idx="1">
+            <a:schemeClr val="accent1"/>
+          </a:lnRef>
+          <a:fillRef idx="0">
+            <a:schemeClr val="accent1"/>
+          </a:fillRef>
+          <a:effectRef idx="0">
+            <a:schemeClr val="accent1"/>
+          </a:effectRef>
+          <a:fontRef idx="minor">
+            <a:schemeClr val="tx1"/>
+          </a:fontRef>
+        </p:style>
+      </p:cxnSp>
+      <p:cxnSp>
+        <p:nvCxnSpPr>
+          <p:cNvPr id="17" name="Straight Connector 16">
+            <a:extLst>
+              <a:ext uri="{FF2B5EF4-FFF2-40B4-BE49-F238E27FC236}">
+                <a16:creationId xmlns:a16="http://schemas.microsoft.com/office/drawing/2014/main" id="{19679D4F-EB08-E27C-8FA3-373EF3814CA2}"/>
+              </a:ext>
+            </a:extLst>
+          </p:cNvPr>
+          <p:cNvCxnSpPr/>
+          <p:nvPr/>
+        </p:nvCxnSpPr>
+        <p:spPr>
+          <a:xfrm>
+            <a:off x="4267784" y="3429000"/>
+            <a:ext cx="7316446" cy="0"/>
+          </a:xfrm>
+          <a:prstGeom prst="line">
+            <a:avLst/>
+          </a:prstGeom>
+        </p:spPr>
+        <p:style>
+          <a:lnRef idx="1">
+            <a:schemeClr val="accent1"/>
+          </a:lnRef>
+          <a:fillRef idx="0">
+            <a:schemeClr val="accent1"/>
+          </a:fillRef>
+          <a:effectRef idx="0">
+            <a:schemeClr val="accent1"/>
+          </a:effectRef>
+          <a:fontRef idx="minor">
+            <a:schemeClr val="tx1"/>
+          </a:fontRef>
+        </p:style>
+      </p:cxnSp>
+      <p:pic>
+        <p:nvPicPr>
+          <p:cNvPr id="22" name="Picture 21">
+            <a:extLst>
+              <a:ext uri="{FF2B5EF4-FFF2-40B4-BE49-F238E27FC236}">
+                <a16:creationId xmlns:a16="http://schemas.microsoft.com/office/drawing/2014/main" id="{FAC5115A-4C7A-A9F0-976B-7AB8277B5B5A}"/>
+              </a:ext>
+            </a:extLst>
+          </p:cNvPr>
+          <p:cNvPicPr>
+            <a:picLocks noChangeAspect="1"/>
+          </p:cNvPicPr>
+          <p:nvPr/>
+        </p:nvPicPr>
+        <p:blipFill>
+          <a:blip r:embed="rId5"/>
+          <a:stretch>
+            <a:fillRect/>
+          </a:stretch>
+        </p:blipFill>
+        <p:spPr>
+          <a:xfrm>
+            <a:off x="5084958" y="3550569"/>
+            <a:ext cx="2006924" cy="1217315"/>
+          </a:xfrm>
+          <a:prstGeom prst="rect">
+            <a:avLst/>
+          </a:prstGeom>
+        </p:spPr>
+      </p:pic>
+      <p:graphicFrame>
+        <p:nvGraphicFramePr>
+          <p:cNvPr id="25" name="Chart 24">
+            <a:extLst>
+              <a:ext uri="{FF2B5EF4-FFF2-40B4-BE49-F238E27FC236}">
+                <a16:creationId xmlns:a16="http://schemas.microsoft.com/office/drawing/2014/main" id="{68FA0E66-9755-8B6C-1577-9F47F800B67D}"/>
+              </a:ext>
+            </a:extLst>
+          </p:cNvPr>
+          <p:cNvGraphicFramePr/>
+          <p:nvPr>
+            <p:extLst>
+              <p:ext uri="{D42A27DB-BD31-4B8C-83A1-F6EECF244321}">
+                <p14:modId xmlns:p14="http://schemas.microsoft.com/office/powerpoint/2010/main" val="446482149"/>
+              </p:ext>
+            </p:extLst>
+          </p:nvPr>
+        </p:nvGraphicFramePr>
+        <p:xfrm>
+          <a:off x="8010041" y="867423"/>
+          <a:ext cx="3660013" cy="2440009"/>
+        </p:xfrm>
+        <a:graphic>
+          <a:graphicData uri="http://schemas.openxmlformats.org/drawingml/2006/chart">
+            <c:chart xmlns:c="http://schemas.openxmlformats.org/drawingml/2006/chart" xmlns:r="http://schemas.openxmlformats.org/officeDocument/2006/relationships" r:id="rId6"/>
+          </a:graphicData>
+        </a:graphic>
+      </p:graphicFrame>
+      <p:graphicFrame>
+        <p:nvGraphicFramePr>
+          <p:cNvPr id="28" name="Chart 27">
+            <a:extLst>
+              <a:ext uri="{FF2B5EF4-FFF2-40B4-BE49-F238E27FC236}">
+                <a16:creationId xmlns:a16="http://schemas.microsoft.com/office/drawing/2014/main" id="{97CEECE4-E282-DF41-A098-9F67DA08F99A}"/>
+              </a:ext>
+            </a:extLst>
+          </p:cNvPr>
+          <p:cNvGraphicFramePr/>
+          <p:nvPr>
+            <p:extLst>
+              <p:ext uri="{D42A27DB-BD31-4B8C-83A1-F6EECF244321}">
+                <p14:modId xmlns:p14="http://schemas.microsoft.com/office/powerpoint/2010/main" val="4145149702"/>
+              </p:ext>
+            </p:extLst>
+          </p:nvPr>
+        </p:nvGraphicFramePr>
+        <p:xfrm>
+          <a:off x="7870147" y="3671121"/>
+          <a:ext cx="4064000" cy="2709334"/>
+        </p:xfrm>
+        <a:graphic>
+          <a:graphicData uri="http://schemas.openxmlformats.org/drawingml/2006/chart">
+            <c:chart xmlns:c="http://schemas.openxmlformats.org/drawingml/2006/chart" xmlns:r="http://schemas.openxmlformats.org/officeDocument/2006/relationships" r:id="rId7"/>
+          </a:graphicData>
+        </a:graphic>
+      </p:graphicFrame>
+      <p:sp>
+        <p:nvSpPr>
+          <p:cNvPr id="29" name="TextBox 28">
+            <a:extLst>
+              <a:ext uri="{FF2B5EF4-FFF2-40B4-BE49-F238E27FC236}">
+                <a16:creationId xmlns:a16="http://schemas.microsoft.com/office/drawing/2014/main" id="{3D0ABCC4-2366-AF41-A5BF-6900B789A9E1}"/>
+              </a:ext>
+            </a:extLst>
+          </p:cNvPr>
+          <p:cNvSpPr txBox="1"/>
+          <p:nvPr/>
+        </p:nvSpPr>
+        <p:spPr>
+          <a:xfrm>
+            <a:off x="5712278" y="1931437"/>
+            <a:ext cx="564578" cy="369332"/>
+          </a:xfrm>
+          <a:prstGeom prst="rect">
+            <a:avLst/>
+          </a:prstGeom>
+          <a:noFill/>
+        </p:spPr>
+        <p:txBody>
+          <a:bodyPr wrap="none" rtlCol="0">
+            <a:spAutoFit/>
+          </a:bodyPr>
+          <a:lstStyle/>
+          <a:p>
+            <a:r>
+              <a:rPr lang="en-US" dirty="0"/>
+              <a:t>TBD</a:t>
+            </a:r>
+            <a:endParaRPr lang="LID4096" dirty="0"/>
+          </a:p>
+        </p:txBody>
+      </p:sp>
+      <p:cxnSp>
+        <p:nvCxnSpPr>
+          <p:cNvPr id="31" name="Straight Connector 30">
+            <a:extLst>
+              <a:ext uri="{FF2B5EF4-FFF2-40B4-BE49-F238E27FC236}">
+                <a16:creationId xmlns:a16="http://schemas.microsoft.com/office/drawing/2014/main" id="{8A58652B-6D7F-E599-1E0A-8C39D551EB89}"/>
+              </a:ext>
+            </a:extLst>
+          </p:cNvPr>
+          <p:cNvCxnSpPr/>
+          <p:nvPr/>
+        </p:nvCxnSpPr>
+        <p:spPr>
+          <a:xfrm>
+            <a:off x="6088420" y="3429000"/>
+            <a:ext cx="0" cy="2542592"/>
+          </a:xfrm>
+          <a:prstGeom prst="line">
+            <a:avLst/>
+          </a:prstGeom>
+        </p:spPr>
+        <p:style>
+          <a:lnRef idx="1">
+            <a:schemeClr val="accent1"/>
+          </a:lnRef>
+          <a:fillRef idx="0">
+            <a:schemeClr val="accent1"/>
+          </a:fillRef>
+          <a:effectRef idx="0">
+            <a:schemeClr val="accent1"/>
+          </a:effectRef>
+          <a:fontRef idx="minor">
+            <a:schemeClr val="tx1"/>
+          </a:fontRef>
+        </p:style>
+      </p:cxnSp>
+      <p:cxnSp>
+        <p:nvCxnSpPr>
+          <p:cNvPr id="33" name="Straight Connector 32">
+            <a:extLst>
+              <a:ext uri="{FF2B5EF4-FFF2-40B4-BE49-F238E27FC236}">
+                <a16:creationId xmlns:a16="http://schemas.microsoft.com/office/drawing/2014/main" id="{F868CE2B-6640-C116-9494-6F1430C12E3B}"/>
+              </a:ext>
+            </a:extLst>
+          </p:cNvPr>
+          <p:cNvCxnSpPr/>
+          <p:nvPr/>
+        </p:nvCxnSpPr>
+        <p:spPr>
+          <a:xfrm>
+            <a:off x="4267784" y="4767884"/>
+            <a:ext cx="3658223" cy="0"/>
+          </a:xfrm>
+          <a:prstGeom prst="line">
+            <a:avLst/>
+          </a:prstGeom>
+        </p:spPr>
+        <p:style>
+          <a:lnRef idx="1">
+            <a:schemeClr val="accent1"/>
+          </a:lnRef>
+          <a:fillRef idx="0">
+            <a:schemeClr val="accent1"/>
+          </a:fillRef>
+          <a:effectRef idx="0">
+            <a:schemeClr val="accent1"/>
+          </a:effectRef>
+          <a:fontRef idx="minor">
+            <a:schemeClr val="tx1"/>
+          </a:fontRef>
+        </p:style>
+      </p:cxnSp>
+      <p:cxnSp>
+        <p:nvCxnSpPr>
+          <p:cNvPr id="35" name="Straight Arrow Connector 34">
+            <a:extLst>
+              <a:ext uri="{FF2B5EF4-FFF2-40B4-BE49-F238E27FC236}">
+                <a16:creationId xmlns:a16="http://schemas.microsoft.com/office/drawing/2014/main" id="{B98CDEC3-041E-31A2-5D5E-51012C01DC06}"/>
+              </a:ext>
+            </a:extLst>
+          </p:cNvPr>
+          <p:cNvCxnSpPr/>
+          <p:nvPr/>
+        </p:nvCxnSpPr>
+        <p:spPr>
+          <a:xfrm flipV="1">
+            <a:off x="3359020" y="5794310"/>
+            <a:ext cx="1080083" cy="671804"/>
+          </a:xfrm>
+          <a:prstGeom prst="straightConnector1">
+            <a:avLst/>
+          </a:prstGeom>
+          <a:ln>
+            <a:tailEnd type="triangle"/>
+          </a:ln>
+        </p:spPr>
+        <p:style>
+          <a:lnRef idx="1">
+            <a:schemeClr val="accent1"/>
+          </a:lnRef>
+          <a:fillRef idx="0">
+            <a:schemeClr val="accent1"/>
+          </a:fillRef>
+          <a:effectRef idx="0">
+            <a:schemeClr val="accent1"/>
+          </a:effectRef>
+          <a:fontRef idx="minor">
+            <a:schemeClr val="tx1"/>
+          </a:fontRef>
+        </p:style>
+      </p:cxnSp>
+      <p:sp>
+        <p:nvSpPr>
+          <p:cNvPr id="36" name="TextBox 35">
+            <a:extLst>
+              <a:ext uri="{FF2B5EF4-FFF2-40B4-BE49-F238E27FC236}">
+                <a16:creationId xmlns:a16="http://schemas.microsoft.com/office/drawing/2014/main" id="{5C5914F2-5928-3AEA-8319-4694C1537876}"/>
+              </a:ext>
+            </a:extLst>
+          </p:cNvPr>
+          <p:cNvSpPr txBox="1"/>
+          <p:nvPr/>
+        </p:nvSpPr>
+        <p:spPr>
+          <a:xfrm>
+            <a:off x="913817" y="6422084"/>
+            <a:ext cx="3985337" cy="369332"/>
+          </a:xfrm>
+          <a:prstGeom prst="rect">
+            <a:avLst/>
+          </a:prstGeom>
+          <a:noFill/>
+        </p:spPr>
+        <p:txBody>
+          <a:bodyPr wrap="square" rtlCol="0">
+            <a:spAutoFit/>
+          </a:bodyPr>
+          <a:lstStyle/>
+          <a:p>
+            <a:pPr algn="ctr"/>
+            <a:r>
+              <a:rPr lang="en-US" dirty="0"/>
+              <a:t>2x2 grid within 2x3 grid</a:t>
+            </a:r>
+          </a:p>
+        </p:txBody>
+      </p:sp>
     </p:spTree>
     <p:extLst>
       <p:ext uri="{BB962C8B-B14F-4D97-AF65-F5344CB8AC3E}">
@@ -5357,6 +7857,102 @@
 </file>
 
 <file path=ppt/slides/slide5.xml><?xml version="1.0" encoding="utf-8"?>
+<p:sld xmlns:a="http://schemas.openxmlformats.org/drawingml/2006/main" xmlns:r="http://schemas.openxmlformats.org/officeDocument/2006/relationships" xmlns:p="http://schemas.openxmlformats.org/presentationml/2006/main">
+  <p:cSld>
+    <p:spTree>
+      <p:nvGrpSpPr>
+        <p:cNvPr id="1" name=""/>
+        <p:cNvGrpSpPr/>
+        <p:nvPr/>
+      </p:nvGrpSpPr>
+      <p:grpSpPr>
+        <a:xfrm>
+          <a:off x="0" y="0"/>
+          <a:ext cx="0" cy="0"/>
+          <a:chOff x="0" y="0"/>
+          <a:chExt cx="0" cy="0"/>
+        </a:xfrm>
+      </p:grpSpPr>
+      <p:pic>
+        <p:nvPicPr>
+          <p:cNvPr id="6" name="Picture 5">
+            <a:extLst>
+              <a:ext uri="{FF2B5EF4-FFF2-40B4-BE49-F238E27FC236}">
+                <a16:creationId xmlns:a16="http://schemas.microsoft.com/office/drawing/2014/main" id="{AE8D5274-0A66-98C3-86DC-9C784832A265}"/>
+              </a:ext>
+            </a:extLst>
+          </p:cNvPr>
+          <p:cNvPicPr>
+            <a:picLocks noChangeAspect="1"/>
+          </p:cNvPicPr>
+          <p:nvPr/>
+        </p:nvPicPr>
+        <p:blipFill>
+          <a:blip r:embed="rId2"/>
+          <a:stretch>
+            <a:fillRect/>
+          </a:stretch>
+        </p:blipFill>
+        <p:spPr>
+          <a:xfrm>
+            <a:off x="0" y="208722"/>
+            <a:ext cx="12192000" cy="6440556"/>
+          </a:xfrm>
+          <a:prstGeom prst="rect">
+            <a:avLst/>
+          </a:prstGeom>
+        </p:spPr>
+      </p:pic>
+      <p:sp>
+        <p:nvSpPr>
+          <p:cNvPr id="7" name="TextBox 6">
+            <a:extLst>
+              <a:ext uri="{FF2B5EF4-FFF2-40B4-BE49-F238E27FC236}">
+                <a16:creationId xmlns:a16="http://schemas.microsoft.com/office/drawing/2014/main" id="{6FCB24E6-C849-D23C-A485-CC978A368B4E}"/>
+              </a:ext>
+            </a:extLst>
+          </p:cNvPr>
+          <p:cNvSpPr txBox="1"/>
+          <p:nvPr/>
+        </p:nvSpPr>
+        <p:spPr>
+          <a:xfrm>
+            <a:off x="7165910" y="401216"/>
+            <a:ext cx="2935099" cy="369332"/>
+          </a:xfrm>
+          <a:prstGeom prst="rect">
+            <a:avLst/>
+          </a:prstGeom>
+          <a:noFill/>
+        </p:spPr>
+        <p:txBody>
+          <a:bodyPr wrap="none" rtlCol="0">
+            <a:spAutoFit/>
+          </a:bodyPr>
+          <a:lstStyle/>
+          <a:p>
+            <a:r>
+              <a:rPr lang="en-US" dirty="0"/>
+              <a:t>- Grid Illustration From the UI</a:t>
+            </a:r>
+            <a:endParaRPr lang="LID4096" dirty="0"/>
+          </a:p>
+        </p:txBody>
+      </p:sp>
+    </p:spTree>
+    <p:extLst>
+      <p:ext uri="{BB962C8B-B14F-4D97-AF65-F5344CB8AC3E}">
+        <p14:creationId xmlns:p14="http://schemas.microsoft.com/office/powerpoint/2010/main" val="2405697313"/>
+      </p:ext>
+    </p:extLst>
+  </p:cSld>
+  <p:clrMapOvr>
+    <a:masterClrMapping/>
+  </p:clrMapOvr>
+</p:sld>
+</file>
+
+<file path=ppt/slides/slide6.xml><?xml version="1.0" encoding="utf-8"?>
 <p:sld xmlns:a="http://schemas.openxmlformats.org/drawingml/2006/main" xmlns:r="http://schemas.openxmlformats.org/officeDocument/2006/relationships" xmlns:p="http://schemas.openxmlformats.org/presentationml/2006/main">
   <p:cSld>
     <p:spTree>

</xml_diff>